<commit_message>
added primary content for the central portion of the poster
</commit_message>
<xml_diff>
--- a/documentation/expo_poster.pptx
+++ b/documentation/expo_poster.pptx
@@ -4066,7 +4066,7 @@
         </p:nvSpPr>
         <p:spPr>
           <a:xfrm>
-            <a:off x="11859522" y="5513014"/>
+            <a:off x="11993285" y="13432425"/>
             <a:ext cx="9222475" cy="7130094"/>
           </a:xfrm>
           <a:prstGeom prst="rect">
@@ -4104,7 +4104,7 @@
             <a:pPr algn="ctr"/>
             <a:r>
               <a:rPr lang="en-US" dirty="0" smtClean="0"/>
-              <a:t>Picture of project</a:t>
+              <a:t>Image of sample bar charts</a:t>
             </a:r>
             <a:endParaRPr lang="en-US" dirty="0"/>
           </a:p>
@@ -4118,8 +4118,8 @@
         </p:nvSpPr>
         <p:spPr>
           <a:xfrm>
-            <a:off x="22198405" y="18823265"/>
-            <a:ext cx="9769019" cy="12056537"/>
+            <a:off x="22400904" y="13390857"/>
+            <a:ext cx="9769019" cy="7130094"/>
           </a:xfrm>
           <a:prstGeom prst="rect">
             <a:avLst/>
@@ -4154,7 +4154,11 @@
           <a:lstStyle/>
           <a:p>
             <a:pPr algn="ctr"/>
-            <a:endParaRPr lang="en-US"/>
+            <a:r>
+              <a:rPr lang="en-US" dirty="0" smtClean="0"/>
+              <a:t>Picture of Generated Models</a:t>
+            </a:r>
+            <a:endParaRPr lang="en-US" dirty="0"/>
           </a:p>
         </p:txBody>
       </p:sp>
@@ -4166,7 +4170,7 @@
         </p:nvSpPr>
         <p:spPr>
           <a:xfrm>
-            <a:off x="734324" y="24515747"/>
+            <a:off x="734324" y="13274749"/>
             <a:ext cx="9506956" cy="6047739"/>
           </a:xfrm>
           <a:prstGeom prst="rect">
@@ -4202,7 +4206,11 @@
           <a:lstStyle/>
           <a:p>
             <a:pPr algn="ctr"/>
-            <a:endParaRPr lang="en-US"/>
+            <a:r>
+              <a:rPr lang="en-US" dirty="0" smtClean="0"/>
+              <a:t>Logos for all the tools we use</a:t>
+            </a:r>
+            <a:endParaRPr lang="en-US" dirty="0"/>
           </a:p>
         </p:txBody>
       </p:sp>
@@ -4886,7 +4894,7 @@
         </p:nvSpPr>
         <p:spPr>
           <a:xfrm>
-            <a:off x="734324" y="14169078"/>
+            <a:off x="623457" y="21414788"/>
             <a:ext cx="9506956" cy="10221584"/>
           </a:xfrm>
           <a:prstGeom prst="rect">
@@ -5240,7 +5248,7 @@
         </p:nvSpPr>
         <p:spPr>
           <a:xfrm>
-            <a:off x="886725" y="30968716"/>
+            <a:off x="769394" y="20115584"/>
             <a:ext cx="9070074" cy="523220"/>
           </a:xfrm>
           <a:prstGeom prst="rect">
@@ -5270,7 +5278,7 @@
         </p:nvSpPr>
         <p:spPr>
           <a:xfrm>
-            <a:off x="11859522" y="13130783"/>
+            <a:off x="11993286" y="5668074"/>
             <a:ext cx="9222475" cy="11384964"/>
           </a:xfrm>
           <a:prstGeom prst="rect">
@@ -5295,7 +5303,7 @@
                   <a:srgbClr val="4A6A7E"/>
                 </a:solidFill>
               </a:rPr>
-              <a:t>Project Description</a:t>
+              <a:t>Problem Description</a:t>
             </a:r>
             <a:endParaRPr lang="en-US" sz="7200" dirty="0">
               <a:solidFill>
@@ -5311,120 +5319,13 @@
             </a:pPr>
             <a:r>
               <a:rPr lang="en-US" sz="4000" dirty="0" smtClean="0"/>
-              <a:t>Body. </a:t>
-            </a:r>
-            <a:r>
-              <a:rPr lang="en-US" sz="4000" dirty="0" err="1" smtClean="0"/>
-              <a:t>Lorem</a:t>
-            </a:r>
-            <a:r>
-              <a:rPr lang="en-US" sz="4000" dirty="0" smtClean="0"/>
-              <a:t> </a:t>
-            </a:r>
-            <a:r>
-              <a:rPr lang="en-US" sz="4000" dirty="0" err="1" smtClean="0"/>
-              <a:t>ipsum</a:t>
-            </a:r>
-            <a:r>
-              <a:rPr lang="en-US" sz="4000" dirty="0" smtClean="0"/>
-              <a:t> dolor sit </a:t>
-            </a:r>
-            <a:r>
-              <a:rPr lang="en-US" sz="4000" dirty="0" err="1" smtClean="0"/>
-              <a:t>amet</a:t>
-            </a:r>
-            <a:r>
-              <a:rPr lang="en-US" sz="4000" dirty="0" smtClean="0"/>
-              <a:t>, </a:t>
-            </a:r>
-            <a:r>
-              <a:rPr lang="en-US" sz="4000" dirty="0" err="1" smtClean="0"/>
-              <a:t>consectetur</a:t>
-            </a:r>
-            <a:r>
-              <a:rPr lang="en-US" sz="4000" dirty="0" smtClean="0"/>
-              <a:t> </a:t>
-            </a:r>
-            <a:r>
-              <a:rPr lang="en-US" sz="4000" dirty="0" err="1" smtClean="0"/>
-              <a:t>adipiscing</a:t>
-            </a:r>
-            <a:r>
-              <a:rPr lang="en-US" sz="4000" dirty="0" smtClean="0"/>
-              <a:t> </a:t>
-            </a:r>
-            <a:r>
-              <a:rPr lang="en-US" sz="4000" dirty="0" err="1" smtClean="0"/>
-              <a:t>elit</a:t>
-            </a:r>
-            <a:r>
-              <a:rPr lang="en-US" sz="4000" dirty="0" smtClean="0"/>
-              <a:t>. </a:t>
-            </a:r>
-            <a:r>
-              <a:rPr lang="en-US" sz="4000" dirty="0" err="1" smtClean="0"/>
-              <a:t>Etiam</a:t>
-            </a:r>
-            <a:r>
-              <a:rPr lang="en-US" sz="4000" dirty="0" smtClean="0"/>
-              <a:t> </a:t>
-            </a:r>
-            <a:r>
-              <a:rPr lang="en-US" sz="4000" dirty="0" err="1" smtClean="0"/>
-              <a:t>tristique</a:t>
-            </a:r>
-            <a:r>
-              <a:rPr lang="en-US" sz="4000" dirty="0" smtClean="0"/>
-              <a:t> </a:t>
-            </a:r>
-            <a:r>
-              <a:rPr lang="en-US" sz="4000" dirty="0" err="1" smtClean="0"/>
-              <a:t>consequat</a:t>
-            </a:r>
-            <a:r>
-              <a:rPr lang="en-US" sz="4000" dirty="0" smtClean="0"/>
-              <a:t> </a:t>
-            </a:r>
-            <a:r>
-              <a:rPr lang="en-US" sz="4000" dirty="0" err="1" smtClean="0"/>
-              <a:t>laoreet</a:t>
-            </a:r>
-            <a:r>
-              <a:rPr lang="en-US" sz="4000" dirty="0" smtClean="0"/>
-              <a:t>. </a:t>
-            </a:r>
-            <a:r>
-              <a:rPr lang="en-US" sz="4000" dirty="0" err="1" smtClean="0"/>
-              <a:t>Nunc</a:t>
-            </a:r>
-            <a:r>
-              <a:rPr lang="en-US" sz="4000" dirty="0" smtClean="0"/>
-              <a:t> </a:t>
-            </a:r>
-            <a:r>
-              <a:rPr lang="en-US" sz="4000" dirty="0" err="1" smtClean="0"/>
-              <a:t>fermentum</a:t>
-            </a:r>
-            <a:r>
-              <a:rPr lang="en-US" sz="4000" dirty="0" smtClean="0"/>
-              <a:t> </a:t>
-            </a:r>
-            <a:r>
-              <a:rPr lang="en-US" sz="4000" dirty="0" err="1" smtClean="0"/>
-              <a:t>pulvinar</a:t>
-            </a:r>
-            <a:r>
-              <a:rPr lang="en-US" sz="4000" dirty="0" smtClean="0"/>
-              <a:t> </a:t>
-            </a:r>
-            <a:r>
-              <a:rPr lang="en-US" sz="4000" dirty="0" err="1" smtClean="0"/>
-              <a:t>ornare</a:t>
-            </a:r>
-            <a:r>
-              <a:rPr lang="en-US" sz="4000" dirty="0" smtClean="0"/>
-              <a:t>.</a:t>
-            </a:r>
+              <a:t>Current </a:t>
+            </a:r>
+            <a:r>
+              <a:rPr lang="en-US" sz="4000" smtClean="0"/>
+              <a:t>visualization technologies are shit</a:t>
+            </a:r>
+            <a:endParaRPr lang="en-US" sz="4000" dirty="0" smtClean="0"/>
           </a:p>
           <a:p>
             <a:pPr marL="457200" indent="-457200">
@@ -5475,7 +5376,7 @@
         </p:nvSpPr>
         <p:spPr>
           <a:xfrm>
-            <a:off x="22198405" y="5221259"/>
+            <a:off x="22198405" y="5636899"/>
             <a:ext cx="9769019" cy="10221584"/>
           </a:xfrm>
           <a:prstGeom prst="rect">
@@ -5500,7 +5401,7 @@
                   <a:srgbClr val="4A6A7E"/>
                 </a:solidFill>
               </a:rPr>
-              <a:t>Solution Implemented</a:t>
+              <a:t>Proposed Solution</a:t>
             </a:r>
             <a:endParaRPr lang="en-US" sz="7200" dirty="0">
               <a:solidFill>
@@ -6444,6 +6345,255 @@
               <a:t>The Many Faces of Microbial Communities</a:t>
             </a:r>
             <a:endParaRPr lang="en-US" sz="7200" dirty="0"/>
+          </a:p>
+        </p:txBody>
+      </p:sp>
+      <p:sp>
+        <p:nvSpPr>
+          <p:cNvPr id="22" name="Rectangle 21"/>
+          <p:cNvSpPr/>
+          <p:nvPr/>
+        </p:nvSpPr>
+        <p:spPr>
+          <a:xfrm>
+            <a:off x="22400903" y="23287597"/>
+            <a:ext cx="9769019" cy="7130094"/>
+          </a:xfrm>
+          <a:prstGeom prst="rect">
+            <a:avLst/>
+          </a:prstGeom>
+          <a:solidFill>
+            <a:schemeClr val="accent2">
+              <a:lumMod val="20000"/>
+              <a:lumOff val="80000"/>
+            </a:schemeClr>
+          </a:solidFill>
+          <a:ln>
+            <a:noFill/>
+          </a:ln>
+          <a:effectLst/>
+        </p:spPr>
+        <p:style>
+          <a:lnRef idx="1">
+            <a:schemeClr val="accent1"/>
+          </a:lnRef>
+          <a:fillRef idx="3">
+            <a:schemeClr val="accent1"/>
+          </a:fillRef>
+          <a:effectRef idx="2">
+            <a:schemeClr val="accent1"/>
+          </a:effectRef>
+          <a:fontRef idx="minor">
+            <a:schemeClr val="lt1"/>
+          </a:fontRef>
+        </p:style>
+        <p:txBody>
+          <a:bodyPr rtlCol="0" anchor="ctr"/>
+          <a:lstStyle/>
+          <a:p>
+            <a:pPr algn="ctr"/>
+            <a:r>
+              <a:rPr lang="en-US" dirty="0" smtClean="0"/>
+              <a:t>Screenshot of configuration process</a:t>
+            </a:r>
+            <a:endParaRPr lang="en-US" dirty="0"/>
+          </a:p>
+        </p:txBody>
+      </p:sp>
+      <p:sp>
+        <p:nvSpPr>
+          <p:cNvPr id="27" name="TextBox 26"/>
+          <p:cNvSpPr txBox="1"/>
+          <p:nvPr/>
+        </p:nvSpPr>
+        <p:spPr>
+          <a:xfrm>
+            <a:off x="11993286" y="23287597"/>
+            <a:ext cx="9222475" cy="7556630"/>
+          </a:xfrm>
+          <a:prstGeom prst="rect">
+            <a:avLst/>
+          </a:prstGeom>
+          <a:noFill/>
+        </p:spPr>
+        <p:txBody>
+          <a:bodyPr wrap="square" rtlCol="0" anchor="t" anchorCtr="0">
+            <a:noAutofit/>
+          </a:bodyPr>
+          <a:lstStyle/>
+          <a:p>
+            <a:pPr>
+              <a:spcAft>
+                <a:spcPts val="2400"/>
+              </a:spcAft>
+            </a:pPr>
+            <a:r>
+              <a:rPr lang="en-US" sz="7200" dirty="0" smtClean="0">
+                <a:solidFill>
+                  <a:srgbClr val="4A6A7E"/>
+                </a:solidFill>
+              </a:rPr>
+              <a:t>Features</a:t>
+            </a:r>
+            <a:endParaRPr lang="en-US" sz="7200" dirty="0">
+              <a:solidFill>
+                <a:srgbClr val="4A6A7E"/>
+              </a:solidFill>
+            </a:endParaRPr>
+          </a:p>
+          <a:p>
+            <a:pPr>
+              <a:spcAft>
+                <a:spcPts val="1800"/>
+              </a:spcAft>
+            </a:pPr>
+            <a:r>
+              <a:rPr lang="en-US" sz="4000" dirty="0" smtClean="0"/>
+              <a:t>Body. Lorem ipsum dolor sit </a:t>
+            </a:r>
+            <a:r>
+              <a:rPr lang="en-US" sz="4000" dirty="0" err="1" smtClean="0"/>
+              <a:t>amet</a:t>
+            </a:r>
+            <a:r>
+              <a:rPr lang="en-US" sz="4000" dirty="0"/>
+              <a:t>.</a:t>
+            </a:r>
+            <a:endParaRPr lang="en-US" sz="4000" dirty="0" smtClean="0"/>
+          </a:p>
+          <a:p>
+            <a:pPr marL="457200" indent="-457200">
+              <a:spcAft>
+                <a:spcPts val="1800"/>
+              </a:spcAft>
+              <a:buFont typeface="Arial" pitchFamily="34" charset="0"/>
+              <a:buChar char="•"/>
+            </a:pPr>
+            <a:r>
+              <a:rPr lang="en-US" sz="4000" dirty="0" smtClean="0"/>
+              <a:t>Feature 1</a:t>
+            </a:r>
+            <a:r>
+              <a:rPr lang="en-US" sz="4000" dirty="0" smtClean="0"/>
+              <a:t> </a:t>
+            </a:r>
+          </a:p>
+          <a:p>
+            <a:pPr marL="457200" indent="-457200">
+              <a:spcAft>
+                <a:spcPts val="1800"/>
+              </a:spcAft>
+              <a:buFont typeface="Arial" pitchFamily="34" charset="0"/>
+              <a:buChar char="•"/>
+            </a:pPr>
+            <a:r>
+              <a:rPr lang="en-US" sz="4000" dirty="0" smtClean="0"/>
+              <a:t>Feature 2</a:t>
+            </a:r>
+            <a:r>
+              <a:rPr lang="en-US" sz="4000" dirty="0" smtClean="0"/>
+              <a:t> </a:t>
+            </a:r>
+          </a:p>
+          <a:p>
+            <a:pPr marL="457200" indent="-457200">
+              <a:spcAft>
+                <a:spcPts val="1800"/>
+              </a:spcAft>
+              <a:buFont typeface="Arial" pitchFamily="34" charset="0"/>
+              <a:buChar char="•"/>
+            </a:pPr>
+            <a:r>
+              <a:rPr lang="en-US" sz="4000" dirty="0" smtClean="0"/>
+              <a:t>Feature 3</a:t>
+            </a:r>
+          </a:p>
+          <a:p>
+            <a:pPr marL="457200" indent="-457200">
+              <a:spcAft>
+                <a:spcPts val="1800"/>
+              </a:spcAft>
+              <a:buFont typeface="Arial" pitchFamily="34" charset="0"/>
+              <a:buChar char="•"/>
+            </a:pPr>
+            <a:r>
+              <a:rPr lang="en-US" sz="4000" dirty="0" smtClean="0"/>
+              <a:t>Feature 4</a:t>
+            </a:r>
+          </a:p>
+          <a:p>
+            <a:pPr marL="457200" indent="-457200">
+              <a:spcAft>
+                <a:spcPts val="1800"/>
+              </a:spcAft>
+              <a:buFont typeface="Arial" pitchFamily="34" charset="0"/>
+              <a:buChar char="•"/>
+            </a:pPr>
+            <a:r>
+              <a:rPr lang="en-US" sz="4000" dirty="0" smtClean="0"/>
+              <a:t>Feature 5</a:t>
+            </a:r>
+            <a:endParaRPr lang="en-US" sz="4000" dirty="0" smtClean="0"/>
+          </a:p>
+        </p:txBody>
+      </p:sp>
+      <p:sp>
+        <p:nvSpPr>
+          <p:cNvPr id="28" name="TextBox 27"/>
+          <p:cNvSpPr txBox="1"/>
+          <p:nvPr/>
+        </p:nvSpPr>
+        <p:spPr>
+          <a:xfrm>
+            <a:off x="11876619" y="21140228"/>
+            <a:ext cx="9070074" cy="523220"/>
+          </a:xfrm>
+          <a:prstGeom prst="rect">
+            <a:avLst/>
+          </a:prstGeom>
+          <a:noFill/>
+        </p:spPr>
+        <p:txBody>
+          <a:bodyPr wrap="square" rtlCol="0">
+            <a:spAutoFit/>
+          </a:bodyPr>
+          <a:lstStyle/>
+          <a:p>
+            <a:r>
+              <a:rPr lang="en-US" sz="2800" i="1" dirty="0" smtClean="0"/>
+              <a:t>Caption</a:t>
+            </a:r>
+            <a:endParaRPr lang="en-US" sz="2800" i="1" dirty="0"/>
+          </a:p>
+        </p:txBody>
+      </p:sp>
+      <p:sp>
+        <p:nvSpPr>
+          <p:cNvPr id="31" name="TextBox 30"/>
+          <p:cNvSpPr txBox="1"/>
+          <p:nvPr/>
+        </p:nvSpPr>
+        <p:spPr>
+          <a:xfrm>
+            <a:off x="22400903" y="21087421"/>
+            <a:ext cx="9070074" cy="523220"/>
+          </a:xfrm>
+          <a:prstGeom prst="rect">
+            <a:avLst/>
+          </a:prstGeom>
+          <a:noFill/>
+        </p:spPr>
+        <p:txBody>
+          <a:bodyPr wrap="square" rtlCol="0">
+            <a:spAutoFit/>
+          </a:bodyPr>
+          <a:lstStyle/>
+          <a:p>
+            <a:r>
+              <a:rPr lang="en-US" sz="2800" i="1" dirty="0" smtClean="0"/>
+              <a:t>Caption</a:t>
+            </a:r>
+            <a:endParaRPr lang="en-US" sz="2800" i="1" dirty="0"/>
           </a:p>
         </p:txBody>
       </p:sp>

</xml_diff>

<commit_message>
now have a complete first draft of the poster
</commit_message>
<xml_diff>
--- a/documentation/expo_poster.pptx
+++ b/documentation/expo_poster.pptx
@@ -4164,58 +4164,6 @@
       </p:sp>
       <p:sp>
         <p:nvSpPr>
-          <p:cNvPr id="24" name="Rectangle 23"/>
-          <p:cNvSpPr/>
-          <p:nvPr/>
-        </p:nvSpPr>
-        <p:spPr>
-          <a:xfrm>
-            <a:off x="734324" y="13274749"/>
-            <a:ext cx="9506956" cy="6047739"/>
-          </a:xfrm>
-          <a:prstGeom prst="rect">
-            <a:avLst/>
-          </a:prstGeom>
-          <a:solidFill>
-            <a:schemeClr val="accent2">
-              <a:lumMod val="20000"/>
-              <a:lumOff val="80000"/>
-            </a:schemeClr>
-          </a:solidFill>
-          <a:ln>
-            <a:noFill/>
-          </a:ln>
-          <a:effectLst/>
-        </p:spPr>
-        <p:style>
-          <a:lnRef idx="1">
-            <a:schemeClr val="accent1"/>
-          </a:lnRef>
-          <a:fillRef idx="3">
-            <a:schemeClr val="accent1"/>
-          </a:fillRef>
-          <a:effectRef idx="2">
-            <a:schemeClr val="accent1"/>
-          </a:effectRef>
-          <a:fontRef idx="minor">
-            <a:schemeClr val="lt1"/>
-          </a:fontRef>
-        </p:style>
-        <p:txBody>
-          <a:bodyPr rtlCol="0" anchor="ctr"/>
-          <a:lstStyle/>
-          <a:p>
-            <a:pPr algn="ctr"/>
-            <a:r>
-              <a:rPr lang="en-US" dirty="0" smtClean="0"/>
-              <a:t>Logos for all the tools we use</a:t>
-            </a:r>
-            <a:endParaRPr lang="en-US" dirty="0"/>
-          </a:p>
-        </p:txBody>
-      </p:sp>
-      <p:sp>
-        <p:nvSpPr>
           <p:cNvPr id="26" name="TextBox 25"/>
           <p:cNvSpPr txBox="1"/>
           <p:nvPr/>
@@ -4263,120 +4211,25 @@
             </a:pPr>
             <a:r>
               <a:rPr lang="en-US" sz="4000" dirty="0" smtClean="0"/>
-              <a:t>Body. </a:t>
+              <a:t>Using the </a:t>
             </a:r>
             <a:r>
               <a:rPr lang="en-US" sz="4000" dirty="0" err="1" smtClean="0"/>
-              <a:t>Lorem</a:t>
+              <a:t>opensource</a:t>
             </a:r>
             <a:r>
               <a:rPr lang="en-US" sz="4000" dirty="0" smtClean="0"/>
-              <a:t> </a:t>
+              <a:t> software </a:t>
             </a:r>
             <a:r>
               <a:rPr lang="en-US" sz="4000" dirty="0" err="1" smtClean="0"/>
-              <a:t>ipsum</a:t>
+              <a:t>MakeHuman</a:t>
             </a:r>
             <a:r>
               <a:rPr lang="en-US" sz="4000" dirty="0" smtClean="0"/>
-              <a:t> dolor sit </a:t>
-            </a:r>
-            <a:r>
-              <a:rPr lang="en-US" sz="4000" dirty="0" err="1" smtClean="0"/>
-              <a:t>amet</a:t>
-            </a:r>
-            <a:r>
-              <a:rPr lang="en-US" sz="4000" dirty="0" smtClean="0"/>
-              <a:t>, </a:t>
-            </a:r>
-            <a:r>
-              <a:rPr lang="en-US" sz="4000" dirty="0" err="1" smtClean="0"/>
-              <a:t>consectetur</a:t>
-            </a:r>
-            <a:r>
-              <a:rPr lang="en-US" sz="4000" dirty="0" smtClean="0"/>
-              <a:t> </a:t>
-            </a:r>
-            <a:r>
-              <a:rPr lang="en-US" sz="4000" dirty="0" err="1" smtClean="0"/>
-              <a:t>adipiscing</a:t>
-            </a:r>
-            <a:r>
-              <a:rPr lang="en-US" sz="4000" dirty="0" smtClean="0"/>
-              <a:t> </a:t>
-            </a:r>
-            <a:r>
-              <a:rPr lang="en-US" sz="4000" dirty="0" err="1" smtClean="0"/>
-              <a:t>elit</a:t>
-            </a:r>
-            <a:r>
-              <a:rPr lang="en-US" sz="4000" dirty="0" smtClean="0"/>
-              <a:t>. </a:t>
-            </a:r>
-            <a:r>
-              <a:rPr lang="en-US" sz="4000" dirty="0" err="1" smtClean="0"/>
-              <a:t>Etiam</a:t>
-            </a:r>
-            <a:r>
-              <a:rPr lang="en-US" sz="4000" dirty="0" smtClean="0"/>
-              <a:t> </a:t>
-            </a:r>
-            <a:r>
-              <a:rPr lang="en-US" sz="4000" dirty="0" err="1" smtClean="0"/>
-              <a:t>tristique</a:t>
-            </a:r>
-            <a:r>
-              <a:rPr lang="en-US" sz="4000" dirty="0" smtClean="0"/>
-              <a:t> </a:t>
-            </a:r>
-            <a:r>
-              <a:rPr lang="en-US" sz="4000" dirty="0" err="1" smtClean="0"/>
-              <a:t>consequat</a:t>
-            </a:r>
-            <a:r>
-              <a:rPr lang="en-US" sz="4000" dirty="0" smtClean="0"/>
-              <a:t> </a:t>
-            </a:r>
-            <a:r>
-              <a:rPr lang="en-US" sz="4000" dirty="0" err="1" smtClean="0"/>
-              <a:t>laoreet</a:t>
-            </a:r>
-            <a:r>
-              <a:rPr lang="en-US" sz="4000" dirty="0" smtClean="0"/>
-              <a:t>. </a:t>
-            </a:r>
-            <a:r>
-              <a:rPr lang="en-US" sz="4000" dirty="0" err="1" smtClean="0"/>
-              <a:t>Nunc</a:t>
-            </a:r>
-            <a:r>
-              <a:rPr lang="en-US" sz="4000" dirty="0" smtClean="0"/>
-              <a:t> </a:t>
-            </a:r>
-            <a:r>
-              <a:rPr lang="en-US" sz="4000" dirty="0" err="1" smtClean="0"/>
-              <a:t>fermentum</a:t>
-            </a:r>
-            <a:r>
-              <a:rPr lang="en-US" sz="4000" dirty="0" smtClean="0"/>
-              <a:t> </a:t>
-            </a:r>
-            <a:r>
-              <a:rPr lang="en-US" sz="4000" dirty="0" err="1" smtClean="0"/>
-              <a:t>pulvinar</a:t>
-            </a:r>
-            <a:r>
-              <a:rPr lang="en-US" sz="4000" dirty="0" smtClean="0"/>
-              <a:t> </a:t>
-            </a:r>
-            <a:r>
-              <a:rPr lang="en-US" sz="4000" dirty="0" err="1" smtClean="0"/>
-              <a:t>ornare</a:t>
-            </a:r>
-            <a:r>
-              <a:rPr lang="en-US" sz="4000" dirty="0" smtClean="0"/>
-              <a:t>.</a:t>
-            </a:r>
+              <a:t>, we can generate various faces based on numerical parameters.</a:t>
+            </a:r>
+            <a:endParaRPr lang="en-US" sz="4000" dirty="0" smtClean="0"/>
           </a:p>
           <a:p>
             <a:pPr marL="457200" indent="-457200">
@@ -4387,61 +4240,10 @@
               <a:buChar char="•"/>
             </a:pPr>
             <a:r>
-              <a:rPr lang="en-US" sz="4000" dirty="0" err="1" smtClean="0"/>
-              <a:t>Fusce</a:t>
-            </a:r>
-            <a:r>
               <a:rPr lang="en-US" sz="4000" dirty="0" smtClean="0"/>
-              <a:t> ac </a:t>
-            </a:r>
-            <a:r>
-              <a:rPr lang="en-US" sz="4000" dirty="0" err="1" smtClean="0"/>
-              <a:t>nunc</a:t>
-            </a:r>
-            <a:r>
-              <a:rPr lang="en-US" sz="4000" dirty="0" smtClean="0"/>
-              <a:t> in </a:t>
-            </a:r>
-            <a:r>
-              <a:rPr lang="en-US" sz="4000" dirty="0" err="1" smtClean="0"/>
-              <a:t>leo</a:t>
-            </a:r>
-            <a:r>
-              <a:rPr lang="en-US" sz="4000" dirty="0" smtClean="0"/>
-              <a:t> </a:t>
-            </a:r>
-            <a:r>
-              <a:rPr lang="en-US" sz="4000" dirty="0" err="1" smtClean="0"/>
-              <a:t>blandit</a:t>
-            </a:r>
-            <a:r>
-              <a:rPr lang="en-US" sz="4000" dirty="0" smtClean="0"/>
-              <a:t> </a:t>
-            </a:r>
-            <a:r>
-              <a:rPr lang="en-US" sz="4000" dirty="0" err="1" smtClean="0"/>
-              <a:t>sagittis</a:t>
-            </a:r>
-            <a:r>
-              <a:rPr lang="en-US" sz="4000" dirty="0" smtClean="0"/>
-              <a:t> </a:t>
-            </a:r>
-            <a:r>
-              <a:rPr lang="en-US" sz="4000" dirty="0" err="1" smtClean="0"/>
-              <a:t>fermentum</a:t>
-            </a:r>
-            <a:r>
-              <a:rPr lang="en-US" sz="4000" dirty="0" smtClean="0"/>
-              <a:t> </a:t>
-            </a:r>
-            <a:r>
-              <a:rPr lang="en-US" sz="4000" dirty="0" err="1" smtClean="0"/>
-              <a:t>eu</a:t>
-            </a:r>
-            <a:r>
-              <a:rPr lang="en-US" sz="4000" dirty="0" smtClean="0"/>
-              <a:t> sem. </a:t>
-            </a:r>
+              <a:t>Load supported file formats (QIIME OTU)</a:t>
+            </a:r>
+            <a:endParaRPr lang="en-US" sz="4000" dirty="0" smtClean="0"/>
           </a:p>
           <a:p>
             <a:pPr marL="457200" indent="-457200">
@@ -4452,69 +4254,22 @@
               <a:buChar char="•"/>
             </a:pPr>
             <a:r>
+              <a:rPr lang="en-US" sz="4000" dirty="0" smtClean="0"/>
+              <a:t>Convert file format to parameters for </a:t>
+            </a:r>
+            <a:r>
               <a:rPr lang="en-US" sz="4000" dirty="0" err="1" smtClean="0"/>
-              <a:t>Curabitur</a:t>
+              <a:t>MakeHuman</a:t>
             </a:r>
             <a:r>
               <a:rPr lang="en-US" sz="4000" dirty="0" smtClean="0"/>
-              <a:t> ligula </a:t>
-            </a:r>
-            <a:r>
-              <a:rPr lang="en-US" sz="4000" dirty="0" err="1" smtClean="0"/>
-              <a:t>odio</a:t>
-            </a:r>
-            <a:r>
-              <a:rPr lang="en-US" sz="4000" dirty="0" smtClean="0"/>
-              <a:t>, </a:t>
-            </a:r>
-            <a:r>
-              <a:rPr lang="en-US" sz="4000" dirty="0" err="1" smtClean="0"/>
-              <a:t>facilisis</a:t>
-            </a:r>
-            <a:r>
-              <a:rPr lang="en-US" sz="4000" dirty="0" smtClean="0"/>
-              <a:t> in </a:t>
-            </a:r>
-            <a:r>
-              <a:rPr lang="en-US" sz="4000" dirty="0" err="1" smtClean="0"/>
-              <a:t>tincidunt</a:t>
+              <a:t> API</a:t>
             </a:r>
             <a:r>
               <a:rPr lang="en-US" sz="4000" dirty="0" smtClean="0"/>
               <a:t> </a:t>
             </a:r>
-            <a:r>
-              <a:rPr lang="en-US" sz="4000" dirty="0" err="1" smtClean="0"/>
-              <a:t>vel</a:t>
-            </a:r>
-            <a:r>
-              <a:rPr lang="en-US" sz="4000" dirty="0" smtClean="0"/>
-              <a:t>, </a:t>
-            </a:r>
-            <a:r>
-              <a:rPr lang="en-US" sz="4000" dirty="0" err="1" smtClean="0"/>
-              <a:t>scelerisque</a:t>
-            </a:r>
-            <a:r>
-              <a:rPr lang="en-US" sz="4000" dirty="0" smtClean="0"/>
-              <a:t> </a:t>
-            </a:r>
-            <a:r>
-              <a:rPr lang="en-US" sz="4000" dirty="0" err="1" smtClean="0"/>
-              <a:t>quis</a:t>
-            </a:r>
-            <a:r>
-              <a:rPr lang="en-US" sz="4000" dirty="0" smtClean="0"/>
-              <a:t> </a:t>
-            </a:r>
-            <a:r>
-              <a:rPr lang="en-US" sz="4000" dirty="0" err="1" smtClean="0"/>
-              <a:t>nulla</a:t>
-            </a:r>
-            <a:r>
-              <a:rPr lang="en-US" sz="4000" dirty="0" smtClean="0"/>
-              <a:t>. </a:t>
-            </a:r>
+            <a:endParaRPr lang="en-US" sz="4000" dirty="0" smtClean="0"/>
           </a:p>
           <a:p>
             <a:pPr marL="457200" indent="-457200">
@@ -4525,53 +4280,30 @@
               <a:buChar char="•"/>
             </a:pPr>
             <a:r>
+              <a:rPr lang="en-US" sz="4000" dirty="0" smtClean="0"/>
+              <a:t>Generate models as </a:t>
+            </a:r>
+            <a:r>
+              <a:rPr lang="en-US" sz="4000" dirty="0" err="1"/>
+              <a:t>W</a:t>
+            </a:r>
+            <a:r>
               <a:rPr lang="en-US" sz="4000" dirty="0" err="1" smtClean="0"/>
-              <a:t>Vivamus</a:t>
+              <a:t>avefront</a:t>
             </a:r>
             <a:r>
               <a:rPr lang="en-US" sz="4000" dirty="0" smtClean="0"/>
-              <a:t> </a:t>
+              <a:t> .</a:t>
             </a:r>
             <a:r>
               <a:rPr lang="en-US" sz="4000" dirty="0" err="1" smtClean="0"/>
-              <a:t>interdum</a:t>
+              <a:t>obj</a:t>
             </a:r>
             <a:r>
               <a:rPr lang="en-US" sz="4000" dirty="0" smtClean="0"/>
-              <a:t> magna </a:t>
-            </a:r>
-            <a:r>
-              <a:rPr lang="en-US" sz="4000" dirty="0" err="1" smtClean="0"/>
-              <a:t>quis</a:t>
-            </a:r>
-            <a:r>
-              <a:rPr lang="en-US" sz="4000" dirty="0" smtClean="0"/>
-              <a:t> </a:t>
-            </a:r>
-            <a:r>
-              <a:rPr lang="en-US" sz="4000" dirty="0" err="1" smtClean="0"/>
-              <a:t>mauris</a:t>
-            </a:r>
-            <a:r>
-              <a:rPr lang="en-US" sz="4000" dirty="0" smtClean="0"/>
-              <a:t> </a:t>
-            </a:r>
-            <a:r>
-              <a:rPr lang="en-US" sz="4000" dirty="0" err="1" smtClean="0"/>
-              <a:t>facilisis</a:t>
-            </a:r>
-            <a:r>
-              <a:rPr lang="en-US" sz="4000" dirty="0" smtClean="0"/>
-              <a:t> </a:t>
-            </a:r>
-            <a:r>
-              <a:rPr lang="en-US" sz="4000" dirty="0" err="1" smtClean="0"/>
-              <a:t>ornare</a:t>
-            </a:r>
-            <a:r>
-              <a:rPr lang="en-US" sz="4000" dirty="0" smtClean="0"/>
-              <a:t>. </a:t>
-            </a:r>
+              <a:t> files</a:t>
+            </a:r>
+            <a:endParaRPr lang="en-US" sz="4000" dirty="0" smtClean="0"/>
           </a:p>
           <a:p>
             <a:pPr marL="457200" indent="-457200">
@@ -4582,61 +4314,18 @@
               <a:buChar char="•"/>
             </a:pPr>
             <a:r>
+              <a:rPr lang="en-US" sz="4000" dirty="0" smtClean="0"/>
+              <a:t>Present models to user using </a:t>
+            </a:r>
+            <a:r>
               <a:rPr lang="en-US" sz="4000" dirty="0" err="1" smtClean="0"/>
-              <a:t>Nunc</a:t>
+              <a:t>Qt</a:t>
             </a:r>
             <a:r>
               <a:rPr lang="en-US" sz="4000" dirty="0" smtClean="0"/>
-              <a:t> </a:t>
-            </a:r>
-            <a:r>
-              <a:rPr lang="en-US" sz="4000" dirty="0" err="1" smtClean="0"/>
-              <a:t>eget</a:t>
-            </a:r>
-            <a:r>
-              <a:rPr lang="en-US" sz="4000" dirty="0" smtClean="0"/>
-              <a:t> </a:t>
-            </a:r>
-            <a:r>
-              <a:rPr lang="en-US" sz="4000" dirty="0" err="1" smtClean="0"/>
-              <a:t>lectus</a:t>
-            </a:r>
-            <a:r>
-              <a:rPr lang="en-US" sz="4000" dirty="0" smtClean="0"/>
-              <a:t> </a:t>
-            </a:r>
-            <a:r>
-              <a:rPr lang="en-US" sz="4000" dirty="0" err="1" smtClean="0"/>
-              <a:t>massa</a:t>
-            </a:r>
-            <a:r>
-              <a:rPr lang="en-US" sz="4000" dirty="0" smtClean="0"/>
-              <a:t>, </a:t>
-            </a:r>
-            <a:r>
-              <a:rPr lang="en-US" sz="4000" dirty="0" err="1" smtClean="0"/>
-              <a:t>quis</a:t>
-            </a:r>
-            <a:r>
-              <a:rPr lang="en-US" sz="4000" dirty="0" smtClean="0"/>
-              <a:t> </a:t>
-            </a:r>
-            <a:r>
-              <a:rPr lang="en-US" sz="4000" dirty="0" err="1" smtClean="0"/>
-              <a:t>ullamcorper</a:t>
-            </a:r>
-            <a:r>
-              <a:rPr lang="en-US" sz="4000" dirty="0" smtClean="0"/>
-              <a:t> </a:t>
-            </a:r>
-            <a:r>
-              <a:rPr lang="en-US" sz="4000" dirty="0" err="1" smtClean="0"/>
-              <a:t>libero</a:t>
-            </a:r>
-            <a:r>
-              <a:rPr lang="en-US" sz="4000" dirty="0" smtClean="0"/>
-              <a:t>.</a:t>
-            </a:r>
+              <a:t> UI framework</a:t>
+            </a:r>
+            <a:endParaRPr lang="en-US" sz="4000" dirty="0" smtClean="0"/>
           </a:p>
         </p:txBody>
       </p:sp>
@@ -4919,7 +4608,7 @@
                   <a:srgbClr val="4A6A7E"/>
                 </a:solidFill>
               </a:rPr>
-              <a:t>Solutions Considered</a:t>
+              <a:t>Technologies Used</a:t>
             </a:r>
             <a:endParaRPr lang="en-US" sz="7200" dirty="0">
               <a:solidFill>
@@ -4936,177 +4625,14 @@
               <a:buChar char="•"/>
             </a:pPr>
             <a:r>
-              <a:rPr lang="en-US" sz="4000" dirty="0" err="1"/>
-              <a:t>Lorem</a:t>
-            </a:r>
-            <a:r>
-              <a:rPr lang="en-US" sz="4000" dirty="0"/>
-              <a:t> </a:t>
-            </a:r>
-            <a:r>
-              <a:rPr lang="en-US" sz="4000" dirty="0" err="1"/>
-              <a:t>ipsum</a:t>
-            </a:r>
-            <a:r>
-              <a:rPr lang="en-US" sz="4000" dirty="0"/>
-              <a:t> dolor sit </a:t>
-            </a:r>
-            <a:r>
-              <a:rPr lang="en-US" sz="4000" dirty="0" err="1"/>
-              <a:t>amet</a:t>
-            </a:r>
-            <a:r>
-              <a:rPr lang="en-US" sz="4000" dirty="0"/>
-              <a:t>, </a:t>
-            </a:r>
-            <a:r>
-              <a:rPr lang="en-US" sz="4000" dirty="0" err="1"/>
-              <a:t>consectetur</a:t>
-            </a:r>
-            <a:r>
-              <a:rPr lang="en-US" sz="4000" dirty="0"/>
-              <a:t> </a:t>
-            </a:r>
-            <a:r>
-              <a:rPr lang="en-US" sz="4000" dirty="0" err="1"/>
-              <a:t>adipiscing</a:t>
-            </a:r>
-            <a:r>
-              <a:rPr lang="en-US" sz="4000" dirty="0"/>
-              <a:t> </a:t>
-            </a:r>
-            <a:r>
-              <a:rPr lang="en-US" sz="4000" dirty="0" err="1"/>
-              <a:t>elit</a:t>
-            </a:r>
-            <a:r>
-              <a:rPr lang="en-US" sz="4000" dirty="0"/>
-              <a:t>. </a:t>
-            </a:r>
-            <a:r>
-              <a:rPr lang="en-US" sz="4000" dirty="0" err="1"/>
-              <a:t>Etiam</a:t>
-            </a:r>
-            <a:r>
-              <a:rPr lang="en-US" sz="4000" dirty="0"/>
-              <a:t> </a:t>
-            </a:r>
-            <a:r>
-              <a:rPr lang="en-US" sz="4000" dirty="0" err="1"/>
-              <a:t>tristique</a:t>
-            </a:r>
-            <a:r>
-              <a:rPr lang="en-US" sz="4000" dirty="0"/>
-              <a:t> </a:t>
-            </a:r>
-            <a:r>
-              <a:rPr lang="en-US" sz="4000" dirty="0" err="1"/>
-              <a:t>consequat</a:t>
-            </a:r>
-            <a:r>
-              <a:rPr lang="en-US" sz="4000" dirty="0"/>
-              <a:t> </a:t>
-            </a:r>
-            <a:r>
-              <a:rPr lang="en-US" sz="4000" dirty="0" err="1"/>
-              <a:t>laoreet</a:t>
-            </a:r>
-            <a:r>
-              <a:rPr lang="en-US" sz="4000" dirty="0"/>
-              <a:t>. </a:t>
-            </a:r>
-            <a:r>
-              <a:rPr lang="en-US" sz="4000" dirty="0" err="1"/>
-              <a:t>Nunc</a:t>
-            </a:r>
-            <a:r>
-              <a:rPr lang="en-US" sz="4000" dirty="0"/>
-              <a:t> </a:t>
-            </a:r>
-            <a:r>
-              <a:rPr lang="en-US" sz="4000" dirty="0" err="1"/>
-              <a:t>fermentum</a:t>
-            </a:r>
-            <a:r>
-              <a:rPr lang="en-US" sz="4000" dirty="0"/>
-              <a:t> </a:t>
-            </a:r>
-            <a:r>
-              <a:rPr lang="en-US" sz="4000" dirty="0" err="1"/>
-              <a:t>pulvinar</a:t>
-            </a:r>
-            <a:r>
-              <a:rPr lang="en-US" sz="4000" dirty="0"/>
-              <a:t> </a:t>
-            </a:r>
-            <a:r>
-              <a:rPr lang="en-US" sz="4000" dirty="0" err="1"/>
-              <a:t>ornare</a:t>
-            </a:r>
-            <a:r>
-              <a:rPr lang="en-US" sz="4000" dirty="0"/>
-              <a:t>. </a:t>
-            </a:r>
-            <a:r>
-              <a:rPr lang="en-US" sz="4000" dirty="0" err="1"/>
-              <a:t>Fusce</a:t>
-            </a:r>
-            <a:r>
-              <a:rPr lang="en-US" sz="4000" dirty="0"/>
-              <a:t> ac </a:t>
-            </a:r>
-            <a:r>
-              <a:rPr lang="en-US" sz="4000" dirty="0" err="1"/>
-              <a:t>nunc</a:t>
-            </a:r>
-            <a:r>
-              <a:rPr lang="en-US" sz="4000" dirty="0"/>
-              <a:t> in </a:t>
-            </a:r>
-            <a:r>
-              <a:rPr lang="en-US" sz="4000" dirty="0" err="1"/>
-              <a:t>leo</a:t>
-            </a:r>
-            <a:r>
-              <a:rPr lang="en-US" sz="4000" dirty="0"/>
-              <a:t> </a:t>
-            </a:r>
-            <a:r>
-              <a:rPr lang="en-US" sz="4000" dirty="0" err="1"/>
-              <a:t>blandit</a:t>
-            </a:r>
-            <a:r>
-              <a:rPr lang="en-US" sz="4000" dirty="0"/>
-              <a:t> </a:t>
-            </a:r>
-            <a:r>
-              <a:rPr lang="en-US" sz="4000" dirty="0" err="1"/>
-              <a:t>sagittis</a:t>
-            </a:r>
-            <a:r>
-              <a:rPr lang="en-US" sz="4000" dirty="0"/>
-              <a:t> </a:t>
-            </a:r>
-            <a:r>
-              <a:rPr lang="en-US" sz="4000" dirty="0" err="1"/>
-              <a:t>fermentum</a:t>
-            </a:r>
-            <a:r>
-              <a:rPr lang="en-US" sz="4000" dirty="0"/>
-              <a:t> </a:t>
-            </a:r>
-            <a:r>
-              <a:rPr lang="en-US" sz="4000" dirty="0" err="1"/>
-              <a:t>eu</a:t>
-            </a:r>
-            <a:r>
-              <a:rPr lang="en-US" sz="4000" dirty="0"/>
-              <a:t> </a:t>
+              <a:rPr lang="en-US" sz="4000" dirty="0" err="1" smtClean="0"/>
+              <a:t>MakeHuman</a:t>
             </a:r>
             <a:r>
               <a:rPr lang="en-US" sz="4000" dirty="0" smtClean="0"/>
-              <a:t>sem.</a:t>
-            </a:r>
+              <a:t> (open source 3D computer graphics software)</a:t>
+            </a:r>
+            <a:endParaRPr lang="en-US" sz="4000" dirty="0" smtClean="0"/>
           </a:p>
           <a:p>
             <a:pPr marL="457200" indent="-457200">
@@ -5117,69 +4643,10 @@
               <a:buChar char="•"/>
             </a:pPr>
             <a:r>
-              <a:rPr lang="en-US" sz="4000" dirty="0" err="1" smtClean="0"/>
-              <a:t>Curabitur</a:t>
-            </a:r>
-            <a:r>
               <a:rPr lang="en-US" sz="4000" dirty="0" smtClean="0"/>
-              <a:t> ligula </a:t>
-            </a:r>
-            <a:r>
-              <a:rPr lang="en-US" sz="4000" dirty="0" err="1" smtClean="0"/>
-              <a:t>odio</a:t>
-            </a:r>
-            <a:r>
-              <a:rPr lang="en-US" sz="4000" dirty="0" smtClean="0"/>
-              <a:t>, </a:t>
-            </a:r>
-            <a:r>
-              <a:rPr lang="en-US" sz="4000" dirty="0" err="1" smtClean="0"/>
-              <a:t>facilisis</a:t>
-            </a:r>
-            <a:r>
-              <a:rPr lang="en-US" sz="4000" dirty="0" smtClean="0"/>
-              <a:t> in </a:t>
-            </a:r>
-            <a:r>
-              <a:rPr lang="en-US" sz="4000" dirty="0" err="1" smtClean="0"/>
-              <a:t>tincidunt</a:t>
-            </a:r>
-            <a:r>
-              <a:rPr lang="en-US" sz="4000" dirty="0" smtClean="0"/>
-              <a:t> </a:t>
-            </a:r>
-            <a:r>
-              <a:rPr lang="en-US" sz="4000" dirty="0" err="1" smtClean="0"/>
-              <a:t>vel</a:t>
-            </a:r>
-            <a:r>
-              <a:rPr lang="en-US" sz="4000" dirty="0" smtClean="0"/>
-              <a:t>, </a:t>
-            </a:r>
-            <a:r>
-              <a:rPr lang="en-US" sz="4000" dirty="0" err="1" smtClean="0"/>
-              <a:t>scelerisque</a:t>
-            </a:r>
-            <a:r>
-              <a:rPr lang="en-US" sz="4000" dirty="0" smtClean="0"/>
-              <a:t> </a:t>
-            </a:r>
-            <a:r>
-              <a:rPr lang="en-US" sz="4000" dirty="0" err="1" smtClean="0"/>
-              <a:t>quis</a:t>
-            </a:r>
-            <a:r>
-              <a:rPr lang="en-US" sz="4000" dirty="0" smtClean="0"/>
-              <a:t> </a:t>
-            </a:r>
-            <a:r>
-              <a:rPr lang="en-US" sz="4000" dirty="0" err="1" smtClean="0"/>
-              <a:t>nulla</a:t>
-            </a:r>
-            <a:r>
-              <a:rPr lang="en-US" sz="4000" dirty="0" smtClean="0"/>
-              <a:t>. </a:t>
-            </a:r>
+              <a:t>Python 3 (general purpose programming language)</a:t>
+            </a:r>
+            <a:endParaRPr lang="en-US" sz="4000" dirty="0" smtClean="0"/>
           </a:p>
           <a:p>
             <a:pPr marL="457200" indent="-457200">
@@ -5191,52 +4658,46 @@
             </a:pPr>
             <a:r>
               <a:rPr lang="en-US" sz="4000" dirty="0" err="1" smtClean="0"/>
-              <a:t>Vivamus</a:t>
+              <a:t>Qt</a:t>
             </a:r>
             <a:r>
               <a:rPr lang="en-US" sz="4000" dirty="0" smtClean="0"/>
-              <a:t> </a:t>
+              <a:t> (cross platform </a:t>
             </a:r>
             <a:r>
               <a:rPr lang="en-US" sz="4000" dirty="0" err="1" smtClean="0"/>
-              <a:t>interdum</a:t>
+              <a:t>gui</a:t>
             </a:r>
             <a:r>
               <a:rPr lang="en-US" sz="4000" dirty="0" smtClean="0"/>
-              <a:t> magna </a:t>
-            </a:r>
+              <a:t> toolkit)</a:t>
+            </a:r>
+          </a:p>
+          <a:p>
+            <a:pPr marL="457200" indent="-457200">
+              <a:spcAft>
+                <a:spcPts val="1800"/>
+              </a:spcAft>
+              <a:buFont typeface="Arial" pitchFamily="34" charset="0"/>
+              <a:buChar char="•"/>
+            </a:pPr>
             <a:r>
               <a:rPr lang="en-US" sz="4000" dirty="0" err="1" smtClean="0"/>
-              <a:t>quis</a:t>
+              <a:t>Wavefront</a:t>
             </a:r>
             <a:r>
               <a:rPr lang="en-US" sz="4000" dirty="0" smtClean="0"/>
-              <a:t> </a:t>
+              <a:t> .</a:t>
             </a:r>
             <a:r>
               <a:rPr lang="en-US" sz="4000" dirty="0" err="1" smtClean="0"/>
-              <a:t>mauris</a:t>
+              <a:t>obj</a:t>
             </a:r>
             <a:r>
               <a:rPr lang="en-US" sz="4000" dirty="0" smtClean="0"/>
-              <a:t> </a:t>
-            </a:r>
-            <a:r>
-              <a:rPr lang="en-US" sz="4000" dirty="0" err="1" smtClean="0"/>
-              <a:t>facilisis</a:t>
-            </a:r>
-            <a:r>
-              <a:rPr lang="en-US" sz="4000" dirty="0" smtClean="0"/>
-              <a:t> </a:t>
-            </a:r>
-            <a:r>
-              <a:rPr lang="en-US" sz="4000" dirty="0" err="1" smtClean="0"/>
-              <a:t>ornare</a:t>
-            </a:r>
-            <a:r>
-              <a:rPr lang="en-US" sz="4000" dirty="0" smtClean="0"/>
-              <a:t>.</a:t>
-            </a:r>
+              <a:t> (geometry definition file format)</a:t>
+            </a:r>
+            <a:endParaRPr lang="en-US" sz="4000" dirty="0" smtClean="0"/>
           </a:p>
         </p:txBody>
       </p:sp>
@@ -5249,7 +4710,7 @@
         <p:spPr>
           <a:xfrm>
             <a:off x="769394" y="20115584"/>
-            <a:ext cx="9070074" cy="523220"/>
+            <a:ext cx="7193466" cy="523220"/>
           </a:xfrm>
           <a:prstGeom prst="rect">
             <a:avLst/>
@@ -5264,7 +4725,7 @@
           <a:p>
             <a:r>
               <a:rPr lang="en-US" sz="2800" i="1" dirty="0" smtClean="0"/>
-              <a:t>Caption</a:t>
+              <a:t>Logos of software used in project</a:t>
             </a:r>
             <a:endParaRPr lang="en-US" sz="2800" i="1" dirty="0"/>
           </a:p>
@@ -5319,13 +4780,90 @@
             </a:pPr>
             <a:r>
               <a:rPr lang="en-US" sz="4000" dirty="0" smtClean="0"/>
-              <a:t>Current </a:t>
-            </a:r>
-            <a:r>
-              <a:rPr lang="en-US" sz="4000" smtClean="0"/>
-              <a:t>visualization technologies are shit</a:t>
-            </a:r>
+              <a:t>Current visualization technologies for population data is unintuitive when attempting to find patterns between samples</a:t>
+            </a:r>
+            <a:r>
+              <a:rPr lang="en-US" sz="4000" dirty="0" smtClean="0"/>
+              <a:t>.</a:t>
+            </a:r>
+          </a:p>
+          <a:p>
+            <a:pPr marL="571500" indent="-571500">
+              <a:spcAft>
+                <a:spcPts val="1800"/>
+              </a:spcAft>
+              <a:buFont typeface="Arial" panose="020B0604020202020204" pitchFamily="34" charset="0"/>
+              <a:buChar char="•"/>
+            </a:pPr>
+            <a:r>
+              <a:rPr lang="en-US" sz="4000" dirty="0" smtClean="0"/>
+              <a:t>Makes scientists jobs more difficult</a:t>
+            </a:r>
+          </a:p>
+          <a:p>
+            <a:pPr marL="571500" indent="-571500">
+              <a:spcAft>
+                <a:spcPts val="1800"/>
+              </a:spcAft>
+              <a:buFont typeface="Arial" panose="020B0604020202020204" pitchFamily="34" charset="0"/>
+              <a:buChar char="•"/>
+            </a:pPr>
+            <a:r>
+              <a:rPr lang="en-US" sz="4000" dirty="0" smtClean="0"/>
+              <a:t>Bar charts and pie charts do not lend themselves to easy comparison for large data sets</a:t>
+            </a:r>
+            <a:endParaRPr lang="en-US" sz="4000" dirty="0"/>
+          </a:p>
+          <a:p>
+            <a:pPr>
+              <a:spcAft>
+                <a:spcPts val="1800"/>
+              </a:spcAft>
+            </a:pPr>
             <a:endParaRPr lang="en-US" sz="4000" dirty="0" smtClean="0"/>
+          </a:p>
+        </p:txBody>
+      </p:sp>
+      <p:sp>
+        <p:nvSpPr>
+          <p:cNvPr id="18" name="TextBox 17"/>
+          <p:cNvSpPr txBox="1"/>
+          <p:nvPr/>
+        </p:nvSpPr>
+        <p:spPr>
+          <a:xfrm>
+            <a:off x="22198405" y="5636899"/>
+            <a:ext cx="9769019" cy="7795526"/>
+          </a:xfrm>
+          <a:prstGeom prst="rect">
+            <a:avLst/>
+          </a:prstGeom>
+          <a:noFill/>
+        </p:spPr>
+        <p:txBody>
+          <a:bodyPr wrap="square" rtlCol="0" anchor="t" anchorCtr="0">
+            <a:noAutofit/>
+          </a:bodyPr>
+          <a:lstStyle/>
+          <a:p>
+            <a:pPr>
+              <a:spcAft>
+                <a:spcPts val="2400"/>
+              </a:spcAft>
+            </a:pPr>
+            <a:r>
+              <a:rPr lang="en-US" sz="7200" dirty="0" smtClean="0">
+                <a:solidFill>
+                  <a:srgbClr val="4A6A7E"/>
+                </a:solidFill>
+              </a:rPr>
+              <a:t>Proposed Solution</a:t>
+            </a:r>
+            <a:endParaRPr lang="en-US" sz="7200" dirty="0">
+              <a:solidFill>
+                <a:srgbClr val="4A6A7E"/>
+              </a:solidFill>
+            </a:endParaRPr>
           </a:p>
           <a:p>
             <a:pPr marL="457200" indent="-457200">
@@ -5336,9 +4874,14 @@
               <a:buChar char="•"/>
             </a:pPr>
             <a:r>
-              <a:rPr lang="en-US" sz="4000" dirty="0" smtClean="0"/>
-              <a:t>How it works </a:t>
-            </a:r>
+              <a:rPr lang="en-US" altLang="en-US" sz="4000" dirty="0" smtClean="0"/>
+              <a:t>The huma</a:t>
+            </a:r>
+            <a:r>
+              <a:rPr lang="en-US" altLang="en-US" sz="4000" dirty="0" smtClean="0"/>
+              <a:t>n brain has a special section just for recognizing faces</a:t>
+            </a:r>
+            <a:endParaRPr lang="en-US" sz="4000" dirty="0" smtClean="0"/>
           </a:p>
           <a:p>
             <a:pPr marL="457200" indent="-457200">
@@ -5350,8 +4893,9 @@
             </a:pPr>
             <a:r>
               <a:rPr lang="en-US" sz="4000" dirty="0" smtClean="0"/>
-              <a:t>Important characteristics </a:t>
-            </a:r>
+              <a:t>We can harness this by generating faces the represent sample data</a:t>
+            </a:r>
+            <a:endParaRPr lang="en-US" sz="4000" dirty="0" smtClean="0"/>
           </a:p>
           <a:p>
             <a:pPr marL="457200" indent="-457200">
@@ -5363,51 +4907,9 @@
             </a:pPr>
             <a:r>
               <a:rPr lang="en-US" sz="4000" dirty="0" smtClean="0"/>
-              <a:t>What’s cool about your design</a:t>
-            </a:r>
-          </a:p>
-        </p:txBody>
-      </p:sp>
-      <p:sp>
-        <p:nvSpPr>
-          <p:cNvPr id="18" name="TextBox 17"/>
-          <p:cNvSpPr txBox="1"/>
-          <p:nvPr/>
-        </p:nvSpPr>
-        <p:spPr>
-          <a:xfrm>
-            <a:off x="22198405" y="5636899"/>
-            <a:ext cx="9769019" cy="10221584"/>
-          </a:xfrm>
-          <a:prstGeom prst="rect">
-            <a:avLst/>
-          </a:prstGeom>
-          <a:noFill/>
-        </p:spPr>
-        <p:txBody>
-          <a:bodyPr wrap="square" rtlCol="0" anchor="t" anchorCtr="0">
-            <a:noAutofit/>
-          </a:bodyPr>
-          <a:lstStyle/>
-          <a:p>
-            <a:pPr>
-              <a:spcAft>
-                <a:spcPts val="2400"/>
-              </a:spcAft>
-            </a:pPr>
-            <a:r>
-              <a:rPr lang="en-US" sz="7200" dirty="0" smtClean="0">
-                <a:solidFill>
-                  <a:srgbClr val="4A6A7E"/>
-                </a:solidFill>
-              </a:rPr>
-              <a:t>Proposed Solution</a:t>
-            </a:r>
-            <a:endParaRPr lang="en-US" sz="7200" dirty="0">
-              <a:solidFill>
-                <a:srgbClr val="4A6A7E"/>
-              </a:solidFill>
-            </a:endParaRPr>
+              <a:t>This allows scientists to find patterns by recognizing them in facial features</a:t>
+            </a:r>
+            <a:endParaRPr lang="en-US" sz="4000" dirty="0" smtClean="0"/>
           </a:p>
           <a:p>
             <a:pPr marL="457200" indent="-457200">
@@ -5418,71 +4920,8 @@
               <a:buChar char="•"/>
             </a:pPr>
             <a:r>
-              <a:rPr lang="en-US" altLang="en-US" sz="4000" dirty="0"/>
-              <a:t>Use bullets to briefly describe in Grandma </a:t>
-            </a:r>
-            <a:r>
-              <a:rPr lang="en-US" altLang="en-US" sz="4000" dirty="0" smtClean="0"/>
-              <a:t>terms</a:t>
-            </a:r>
-            <a:r>
               <a:rPr lang="en-US" sz="4000" dirty="0" smtClean="0"/>
-              <a:t> </a:t>
-            </a:r>
-          </a:p>
-          <a:p>
-            <a:pPr marL="457200" indent="-457200">
-              <a:spcAft>
-                <a:spcPts val="1800"/>
-              </a:spcAft>
-              <a:buFont typeface="Arial" pitchFamily="34" charset="0"/>
-              <a:buChar char="•"/>
-            </a:pPr>
-            <a:r>
-              <a:rPr lang="en-US" altLang="en-US" sz="4000" dirty="0"/>
-              <a:t>What do you do with this – how does it apply in real </a:t>
-            </a:r>
-            <a:r>
-              <a:rPr lang="en-US" altLang="en-US" sz="4000" dirty="0" smtClean="0"/>
-              <a:t>life</a:t>
-            </a:r>
-            <a:r>
-              <a:rPr lang="en-US" sz="4000" dirty="0" smtClean="0"/>
-              <a:t> </a:t>
-            </a:r>
-          </a:p>
-          <a:p>
-            <a:pPr marL="457200" indent="-457200">
-              <a:spcAft>
-                <a:spcPts val="1800"/>
-              </a:spcAft>
-              <a:buFont typeface="Arial" pitchFamily="34" charset="0"/>
-              <a:buChar char="•"/>
-            </a:pPr>
-            <a:r>
-              <a:rPr lang="en-US" altLang="en-US" sz="4000" dirty="0"/>
-              <a:t>How is it </a:t>
-            </a:r>
-            <a:r>
-              <a:rPr lang="en-US" altLang="en-US" sz="4000" dirty="0" smtClean="0"/>
-              <a:t>used</a:t>
-            </a:r>
-            <a:r>
-              <a:rPr lang="en-US" sz="4000" dirty="0" smtClean="0"/>
-              <a:t> </a:t>
-            </a:r>
-          </a:p>
-          <a:p>
-            <a:pPr marL="457200" indent="-457200">
-              <a:spcAft>
-                <a:spcPts val="1800"/>
-              </a:spcAft>
-              <a:buFont typeface="Arial" pitchFamily="34" charset="0"/>
-              <a:buChar char="•"/>
-            </a:pPr>
-            <a:r>
-              <a:rPr lang="en-US" sz="4000" dirty="0"/>
-              <a:t>Why does the person viewing the poster care</a:t>
+              <a:t>This could potentially open up breakthroughs in microbiology</a:t>
             </a:r>
             <a:endParaRPr lang="en-US" sz="4000" dirty="0" smtClean="0"/>
           </a:p>
@@ -5512,7 +4951,7 @@
           <a:p>
             <a:r>
               <a:rPr lang="en-US" sz="2800" i="1" dirty="0" smtClean="0"/>
-              <a:t>Caption</a:t>
+              <a:t>Selection and grouping tools for larger data sets</a:t>
             </a:r>
             <a:endParaRPr lang="en-US" sz="2800" i="1" dirty="0"/>
           </a:p>
@@ -5865,7 +5304,15 @@
                   <a:srgbClr val="4A6A7E"/>
                 </a:solidFill>
               </a:rPr>
-              <a:t>Results and Recommendations</a:t>
+              <a:t>Results and </a:t>
+            </a:r>
+            <a:r>
+              <a:rPr lang="en-US" sz="7200" dirty="0" smtClean="0">
+                <a:solidFill>
+                  <a:srgbClr val="4A6A7E"/>
+                </a:solidFill>
+              </a:rPr>
+              <a:t>Recommendations (TBD)</a:t>
             </a:r>
             <a:endParaRPr lang="en-US" sz="7200" dirty="0">
               <a:solidFill>
@@ -6408,8 +5855,8 @@
         </p:nvSpPr>
         <p:spPr>
           <a:xfrm>
-            <a:off x="11993286" y="23287597"/>
-            <a:ext cx="9222475" cy="7556630"/>
+            <a:off x="11993286" y="23370725"/>
+            <a:ext cx="9578241" cy="7556630"/>
           </a:xfrm>
           <a:prstGeom prst="rect">
             <a:avLst/>
@@ -6449,15 +5896,7 @@
             </a:pPr>
             <a:r>
               <a:rPr lang="en-US" sz="4000" dirty="0" smtClean="0"/>
-              <a:t>Body. Lorem ipsum dolor sit </a:t>
-            </a:r>
-            <a:r>
-              <a:rPr lang="en-US" sz="4000" dirty="0" err="1" smtClean="0"/>
-              <a:t>amet</a:t>
-            </a:r>
-            <a:r>
-              <a:rPr lang="en-US" sz="4000" dirty="0"/>
-              <a:t>.</a:t>
+              <a:t>Additional features have been included to allow for easy use and optimal model generation.</a:t>
             </a:r>
             <a:endParaRPr lang="en-US" sz="4000" dirty="0" smtClean="0"/>
           </a:p>
@@ -6471,11 +5910,7 @@
             </a:pPr>
             <a:r>
               <a:rPr lang="en-US" sz="4000" dirty="0" smtClean="0"/>
-              <a:t>Feature 1</a:t>
-            </a:r>
-            <a:r>
-              <a:rPr lang="en-US" sz="4000" dirty="0" smtClean="0"/>
-              <a:t> </a:t>
+              <a:t>Model generation parameterization</a:t>
             </a:r>
           </a:p>
           <a:p>
@@ -6488,11 +5923,7 @@
             </a:pPr>
             <a:r>
               <a:rPr lang="en-US" sz="4000" dirty="0" smtClean="0"/>
-              <a:t>Feature 2</a:t>
-            </a:r>
-            <a:r>
-              <a:rPr lang="en-US" sz="4000" dirty="0" smtClean="0"/>
-              <a:t> </a:t>
+              <a:t>Sample grouping based on metadata</a:t>
             </a:r>
           </a:p>
           <a:p>
@@ -6505,7 +5936,7 @@
             </a:pPr>
             <a:r>
               <a:rPr lang="en-US" sz="4000" dirty="0" smtClean="0"/>
-              <a:t>Feature 3</a:t>
+              <a:t>QIIME OTU format support</a:t>
             </a:r>
           </a:p>
           <a:p>
@@ -6518,22 +5949,8 @@
             </a:pPr>
             <a:r>
               <a:rPr lang="en-US" sz="4000" dirty="0" smtClean="0"/>
-              <a:t>Feature 4</a:t>
-            </a:r>
-          </a:p>
-          <a:p>
-            <a:pPr marL="457200" indent="-457200">
-              <a:spcAft>
-                <a:spcPts val="1800"/>
-              </a:spcAft>
-              <a:buFont typeface="Arial" pitchFamily="34" charset="0"/>
-              <a:buChar char="•"/>
-            </a:pPr>
-            <a:r>
-              <a:rPr lang="en-US" sz="4000" dirty="0" smtClean="0"/>
-              <a:t>Feature 5</a:t>
-            </a:r>
-            <a:endParaRPr lang="en-US" sz="4000" dirty="0" smtClean="0"/>
+              <a:t>Rotate, pan, and zoom around models</a:t>
+            </a:r>
           </a:p>
         </p:txBody>
       </p:sp>
@@ -6561,7 +5978,7 @@
           <a:p>
             <a:r>
               <a:rPr lang="en-US" sz="2800" i="1" dirty="0" smtClean="0"/>
-              <a:t>Caption</a:t>
+              <a:t>A bar chart of sample microbial data</a:t>
             </a:r>
             <a:endParaRPr lang="en-US" sz="2800" i="1" dirty="0"/>
           </a:p>
@@ -6591,12 +6008,135 @@
           <a:p>
             <a:r>
               <a:rPr lang="en-US" sz="2800" i="1" dirty="0" smtClean="0"/>
-              <a:t>Caption</a:t>
+              <a:t>Models generated from sample microbial data</a:t>
             </a:r>
             <a:endParaRPr lang="en-US" sz="2800" i="1" dirty="0"/>
           </a:p>
         </p:txBody>
       </p:sp>
+      <p:pic>
+        <p:nvPicPr>
+          <p:cNvPr id="1028" name="Picture 4" descr="http://www.makehuman.org/images/logo.png"/>
+          <p:cNvPicPr>
+            <a:picLocks noChangeAspect="1" noChangeArrowheads="1"/>
+          </p:cNvPicPr>
+          <p:nvPr/>
+        </p:nvPicPr>
+        <p:blipFill>
+          <a:blip r:embed="rId5">
+            <a:extLst>
+              <a:ext uri="{28A0092B-C50C-407E-A947-70E740481C1C}">
+                <a14:useLocalDpi xmlns:a14="http://schemas.microsoft.com/office/drawing/2010/main" val="0"/>
+              </a:ext>
+            </a:extLst>
+          </a:blip>
+          <a:srcRect/>
+          <a:stretch>
+            <a:fillRect/>
+          </a:stretch>
+        </p:blipFill>
+        <p:spPr bwMode="auto">
+          <a:xfrm>
+            <a:off x="641947" y="15878249"/>
+            <a:ext cx="11194959" cy="2985325"/>
+          </a:xfrm>
+          <a:prstGeom prst="rect">
+            <a:avLst/>
+          </a:prstGeom>
+          <a:noFill/>
+          <a:extLst>
+            <a:ext uri="{909E8E84-426E-40DD-AFC4-6F175D3DCCD1}">
+              <a14:hiddenFill xmlns:a14="http://schemas.microsoft.com/office/drawing/2010/main">
+                <a:solidFill>
+                  <a:srgbClr val="FFFFFF"/>
+                </a:solidFill>
+              </a14:hiddenFill>
+            </a:ext>
+          </a:extLst>
+        </p:spPr>
+      </p:pic>
+      <p:pic>
+        <p:nvPicPr>
+          <p:cNvPr id="1030" name="Picture 6" descr="http://reichertbrothers.com/images/qt-logo.png"/>
+          <p:cNvPicPr>
+            <a:picLocks noChangeAspect="1" noChangeArrowheads="1"/>
+          </p:cNvPicPr>
+          <p:nvPr/>
+        </p:nvPicPr>
+        <p:blipFill>
+          <a:blip r:embed="rId6">
+            <a:extLst>
+              <a:ext uri="{28A0092B-C50C-407E-A947-70E740481C1C}">
+                <a14:useLocalDpi xmlns:a14="http://schemas.microsoft.com/office/drawing/2010/main" val="0"/>
+              </a:ext>
+            </a:extLst>
+          </a:blip>
+          <a:srcRect/>
+          <a:stretch>
+            <a:fillRect/>
+          </a:stretch>
+        </p:blipFill>
+        <p:spPr bwMode="auto">
+          <a:xfrm>
+            <a:off x="6632806" y="12293589"/>
+            <a:ext cx="4201046" cy="4201047"/>
+          </a:xfrm>
+          <a:prstGeom prst="rect">
+            <a:avLst/>
+          </a:prstGeom>
+          <a:noFill/>
+          <a:extLst>
+            <a:ext uri="{909E8E84-426E-40DD-AFC4-6F175D3DCCD1}">
+              <a14:hiddenFill xmlns:a14="http://schemas.microsoft.com/office/drawing/2010/main">
+                <a:solidFill>
+                  <a:srgbClr val="FFFFFF"/>
+                </a:solidFill>
+              </a14:hiddenFill>
+            </a:ext>
+          </a:extLst>
+        </p:spPr>
+      </p:pic>
+      <p:pic>
+        <p:nvPicPr>
+          <p:cNvPr id="1032" name="Picture 8" descr="http://i1-news.softpedia-static.com/images/news2/Python-3-3-2-Released-with-Multiple-Crash-Fixes-2.png"/>
+          <p:cNvPicPr>
+            <a:picLocks noChangeAspect="1" noChangeArrowheads="1"/>
+          </p:cNvPicPr>
+          <p:nvPr/>
+        </p:nvPicPr>
+        <p:blipFill>
+          <a:blip r:embed="rId7">
+            <a:extLst>
+              <a:ext uri="{28A0092B-C50C-407E-A947-70E740481C1C}">
+                <a14:useLocalDpi xmlns:a14="http://schemas.microsoft.com/office/drawing/2010/main" val="0"/>
+              </a:ext>
+            </a:extLst>
+          </a:blip>
+          <a:srcRect/>
+          <a:stretch>
+            <a:fillRect/>
+          </a:stretch>
+        </p:blipFill>
+        <p:spPr bwMode="auto">
+          <a:xfrm>
+            <a:off x="207883" y="12571908"/>
+            <a:ext cx="6934200" cy="3686176"/>
+          </a:xfrm>
+          <a:prstGeom prst="rect">
+            <a:avLst/>
+          </a:prstGeom>
+          <a:noFill/>
+          <a:extLst>
+            <a:ext uri="{909E8E84-426E-40DD-AFC4-6F175D3DCCD1}">
+              <a14:hiddenFill xmlns:a14="http://schemas.microsoft.com/office/drawing/2010/main">
+                <a:solidFill>
+                  <a:srgbClr val="FFFFFF"/>
+                </a:solidFill>
+              </a14:hiddenFill>
+            </a:ext>
+          </a:extLst>
+        </p:spPr>
+      </p:pic>
     </p:spTree>
     <p:extLst>
       <p:ext uri="{BB962C8B-B14F-4D97-AF65-F5344CB8AC3E}">

</xml_diff>

<commit_message>
made changes based on feedback
</commit_message>
<xml_diff>
--- a/documentation/expo_poster.pptx
+++ b/documentation/expo_poster.pptx
@@ -222,7 +222,7 @@
           <a:p>
             <a:fld id="{0F1A93FA-A810-4E6E-87EB-DCBA577F83C7}" type="datetimeFigureOut">
               <a:rPr lang="en-US" smtClean="0"/>
-              <a:t>11/12/2015</a:t>
+              <a:t>11/17/2015</a:t>
             </a:fld>
             <a:endParaRPr lang="en-US"/>
           </a:p>
@@ -1322,7 +1322,7 @@
           <a:p>
             <a:fld id="{56B6BD69-149A-CD41-9E7C-E241C9398BA0}" type="datetimeFigureOut">
               <a:rPr lang="en-US" smtClean="0"/>
-              <a:t>11/12/2015</a:t>
+              <a:t>11/17/2015</a:t>
             </a:fld>
             <a:endParaRPr lang="en-US"/>
           </a:p>
@@ -1502,7 +1502,7 @@
           <a:p>
             <a:fld id="{56B6BD69-149A-CD41-9E7C-E241C9398BA0}" type="datetimeFigureOut">
               <a:rPr lang="en-US" smtClean="0"/>
-              <a:t>11/12/2015</a:t>
+              <a:t>11/17/2015</a:t>
             </a:fld>
             <a:endParaRPr lang="en-US"/>
           </a:p>
@@ -1672,7 +1672,7 @@
           <a:p>
             <a:fld id="{56B6BD69-149A-CD41-9E7C-E241C9398BA0}" type="datetimeFigureOut">
               <a:rPr lang="en-US" smtClean="0"/>
-              <a:t>11/12/2015</a:t>
+              <a:t>11/17/2015</a:t>
             </a:fld>
             <a:endParaRPr lang="en-US"/>
           </a:p>
@@ -1918,7 +1918,7 @@
           <a:p>
             <a:fld id="{56B6BD69-149A-CD41-9E7C-E241C9398BA0}" type="datetimeFigureOut">
               <a:rPr lang="en-US" smtClean="0"/>
-              <a:t>11/12/2015</a:t>
+              <a:t>11/17/2015</a:t>
             </a:fld>
             <a:endParaRPr lang="en-US"/>
           </a:p>
@@ -2206,7 +2206,7 @@
           <a:p>
             <a:fld id="{56B6BD69-149A-CD41-9E7C-E241C9398BA0}" type="datetimeFigureOut">
               <a:rPr lang="en-US" smtClean="0"/>
-              <a:t>11/12/2015</a:t>
+              <a:t>11/17/2015</a:t>
             </a:fld>
             <a:endParaRPr lang="en-US"/>
           </a:p>
@@ -2633,7 +2633,7 @@
           <a:p>
             <a:fld id="{56B6BD69-149A-CD41-9E7C-E241C9398BA0}" type="datetimeFigureOut">
               <a:rPr lang="en-US" smtClean="0"/>
-              <a:t>11/12/2015</a:t>
+              <a:t>11/17/2015</a:t>
             </a:fld>
             <a:endParaRPr lang="en-US"/>
           </a:p>
@@ -2751,7 +2751,7 @@
           <a:p>
             <a:fld id="{56B6BD69-149A-CD41-9E7C-E241C9398BA0}" type="datetimeFigureOut">
               <a:rPr lang="en-US" smtClean="0"/>
-              <a:t>11/12/2015</a:t>
+              <a:t>11/17/2015</a:t>
             </a:fld>
             <a:endParaRPr lang="en-US"/>
           </a:p>
@@ -2846,7 +2846,7 @@
           <a:p>
             <a:fld id="{56B6BD69-149A-CD41-9E7C-E241C9398BA0}" type="datetimeFigureOut">
               <a:rPr lang="en-US" smtClean="0"/>
-              <a:t>11/12/2015</a:t>
+              <a:t>11/17/2015</a:t>
             </a:fld>
             <a:endParaRPr lang="en-US"/>
           </a:p>
@@ -3123,7 +3123,7 @@
           <a:p>
             <a:fld id="{56B6BD69-149A-CD41-9E7C-E241C9398BA0}" type="datetimeFigureOut">
               <a:rPr lang="en-US" smtClean="0"/>
-              <a:t>11/12/2015</a:t>
+              <a:t>11/17/2015</a:t>
             </a:fld>
             <a:endParaRPr lang="en-US"/>
           </a:p>
@@ -3376,7 +3376,7 @@
           <a:p>
             <a:fld id="{56B6BD69-149A-CD41-9E7C-E241C9398BA0}" type="datetimeFigureOut">
               <a:rPr lang="en-US" smtClean="0"/>
-              <a:t>11/12/2015</a:t>
+              <a:t>11/17/2015</a:t>
             </a:fld>
             <a:endParaRPr lang="en-US"/>
           </a:p>
@@ -3589,7 +3589,7 @@
           <a:p>
             <a:fld id="{56B6BD69-149A-CD41-9E7C-E241C9398BA0}" type="datetimeFigureOut">
               <a:rPr lang="en-US" smtClean="0"/>
-              <a:t>11/12/2015</a:t>
+              <a:t>11/17/2015</a:t>
             </a:fld>
             <a:endParaRPr lang="en-US"/>
           </a:p>
@@ -4229,7 +4229,6 @@
               <a:rPr lang="en-US" sz="4000" dirty="0" smtClean="0"/>
               <a:t>, we can generate various faces based on numerical parameters.</a:t>
             </a:r>
-            <a:endParaRPr lang="en-US" sz="4000" dirty="0" smtClean="0"/>
           </a:p>
           <a:p>
             <a:pPr marL="457200" indent="-457200">
@@ -4243,7 +4242,6 @@
               <a:rPr lang="en-US" sz="4000" dirty="0" smtClean="0"/>
               <a:t>Load supported file formats (QIIME OTU)</a:t>
             </a:r>
-            <a:endParaRPr lang="en-US" sz="4000" dirty="0" smtClean="0"/>
           </a:p>
           <a:p>
             <a:pPr marL="457200" indent="-457200">
@@ -4263,13 +4261,8 @@
             </a:r>
             <a:r>
               <a:rPr lang="en-US" sz="4000" dirty="0" smtClean="0"/>
-              <a:t> API</a:t>
-            </a:r>
-            <a:r>
-              <a:rPr lang="en-US" sz="4000" dirty="0" smtClean="0"/>
-              <a:t> </a:t>
-            </a:r>
-            <a:endParaRPr lang="en-US" sz="4000" dirty="0" smtClean="0"/>
+              <a:t> API </a:t>
+            </a:r>
           </a:p>
           <a:p>
             <a:pPr marL="457200" indent="-457200">
@@ -4303,7 +4296,6 @@
               <a:rPr lang="en-US" sz="4000" dirty="0" smtClean="0"/>
               <a:t> files</a:t>
             </a:r>
-            <a:endParaRPr lang="en-US" sz="4000" dirty="0" smtClean="0"/>
           </a:p>
           <a:p>
             <a:pPr marL="457200" indent="-457200">
@@ -4325,7 +4317,6 @@
               <a:rPr lang="en-US" sz="4000" dirty="0" smtClean="0"/>
               <a:t> UI framework</a:t>
             </a:r>
-            <a:endParaRPr lang="en-US" sz="4000" dirty="0" smtClean="0"/>
           </a:p>
         </p:txBody>
       </p:sp>
@@ -4632,7 +4623,6 @@
               <a:rPr lang="en-US" sz="4000" dirty="0" smtClean="0"/>
               <a:t> (open source 3D computer graphics software)</a:t>
             </a:r>
-            <a:endParaRPr lang="en-US" sz="4000" dirty="0" smtClean="0"/>
           </a:p>
           <a:p>
             <a:pPr marL="457200" indent="-457200">
@@ -4646,7 +4636,6 @@
               <a:rPr lang="en-US" sz="4000" dirty="0" smtClean="0"/>
               <a:t>Python 3 (general purpose programming language)</a:t>
             </a:r>
-            <a:endParaRPr lang="en-US" sz="4000" dirty="0" smtClean="0"/>
           </a:p>
           <a:p>
             <a:pPr marL="457200" indent="-457200">
@@ -4697,7 +4686,6 @@
               <a:rPr lang="en-US" sz="4000" dirty="0" smtClean="0"/>
               <a:t> (geometry definition file format)</a:t>
             </a:r>
-            <a:endParaRPr lang="en-US" sz="4000" dirty="0" smtClean="0"/>
           </a:p>
         </p:txBody>
       </p:sp>
@@ -4780,11 +4768,7 @@
             </a:pPr>
             <a:r>
               <a:rPr lang="en-US" sz="4000" dirty="0" smtClean="0"/>
-              <a:t>Current visualization technologies for population data is unintuitive when attempting to find patterns between samples</a:t>
-            </a:r>
-            <a:r>
-              <a:rPr lang="en-US" sz="4000" dirty="0" smtClean="0"/>
-              <a:t>.</a:t>
+              <a:t>Current visualization technologies for population data is unintuitive when attempting to find patterns between samples.</a:t>
             </a:r>
           </a:p>
           <a:p>
@@ -4875,11 +4859,7 @@
             </a:pPr>
             <a:r>
               <a:rPr lang="en-US" altLang="en-US" sz="4000" dirty="0" smtClean="0"/>
-              <a:t>The huma</a:t>
-            </a:r>
-            <a:r>
-              <a:rPr lang="en-US" altLang="en-US" sz="4000" dirty="0" smtClean="0"/>
-              <a:t>n brain has a special section just for recognizing faces</a:t>
+              <a:t>The human brain has a special section just for recognizing faces</a:t>
             </a:r>
             <a:endParaRPr lang="en-US" sz="4000" dirty="0" smtClean="0"/>
           </a:p>
@@ -4895,7 +4875,6 @@
               <a:rPr lang="en-US" sz="4000" dirty="0" smtClean="0"/>
               <a:t>We can harness this by generating faces the represent sample data</a:t>
             </a:r>
-            <a:endParaRPr lang="en-US" sz="4000" dirty="0" smtClean="0"/>
           </a:p>
           <a:p>
             <a:pPr marL="457200" indent="-457200">
@@ -4909,7 +4888,6 @@
               <a:rPr lang="en-US" sz="4000" dirty="0" smtClean="0"/>
               <a:t>This allows scientists to find patterns by recognizing them in facial features</a:t>
             </a:r>
-            <a:endParaRPr lang="en-US" sz="4000" dirty="0" smtClean="0"/>
           </a:p>
           <a:p>
             <a:pPr marL="457200" indent="-457200">
@@ -4923,7 +4901,6 @@
               <a:rPr lang="en-US" sz="4000" dirty="0" smtClean="0"/>
               <a:t>This could potentially open up breakthroughs in microbiology</a:t>
             </a:r>
-            <a:endParaRPr lang="en-US" sz="4000" dirty="0" smtClean="0"/>
           </a:p>
         </p:txBody>
       </p:sp>
@@ -5312,7 +5289,7 @@
                   <a:srgbClr val="4A6A7E"/>
                 </a:solidFill>
               </a:rPr>
-              <a:t>Recommendations (TBD)</a:t>
+              <a:t>Recommendations</a:t>
             </a:r>
             <a:endParaRPr lang="en-US" sz="7200" dirty="0">
               <a:solidFill>
@@ -5329,120 +5306,19 @@
               <a:buChar char="•"/>
             </a:pPr>
             <a:r>
-              <a:rPr lang="en-US" altLang="en-US" sz="4000" dirty="0" err="1"/>
-              <a:t>Lorem</a:t>
-            </a:r>
-            <a:r>
-              <a:rPr lang="en-US" altLang="en-US" sz="4000" dirty="0"/>
-              <a:t> </a:t>
-            </a:r>
-            <a:r>
-              <a:rPr lang="en-US" altLang="en-US" sz="4000" dirty="0" err="1"/>
-              <a:t>ipsum</a:t>
-            </a:r>
-            <a:r>
-              <a:rPr lang="en-US" altLang="en-US" sz="4000" dirty="0"/>
-              <a:t> dolor sit </a:t>
-            </a:r>
-            <a:r>
-              <a:rPr lang="en-US" altLang="en-US" sz="4000" dirty="0" err="1"/>
-              <a:t>amet</a:t>
-            </a:r>
-            <a:r>
-              <a:rPr lang="en-US" altLang="en-US" sz="4000" dirty="0"/>
-              <a:t>, </a:t>
-            </a:r>
-            <a:r>
-              <a:rPr lang="en-US" altLang="en-US" sz="4000" dirty="0" err="1"/>
-              <a:t>consectetur</a:t>
-            </a:r>
-            <a:r>
-              <a:rPr lang="en-US" altLang="en-US" sz="4000" dirty="0"/>
-              <a:t> </a:t>
-            </a:r>
-            <a:r>
-              <a:rPr lang="en-US" altLang="en-US" sz="4000" dirty="0" err="1"/>
-              <a:t>adipiscing</a:t>
-            </a:r>
-            <a:r>
-              <a:rPr lang="en-US" altLang="en-US" sz="4000" dirty="0"/>
-              <a:t> </a:t>
-            </a:r>
-            <a:r>
-              <a:rPr lang="en-US" altLang="en-US" sz="4000" dirty="0" err="1"/>
-              <a:t>elit</a:t>
-            </a:r>
-            <a:r>
-              <a:rPr lang="en-US" altLang="en-US" sz="4000" dirty="0"/>
-              <a:t>. </a:t>
-            </a:r>
-            <a:r>
-              <a:rPr lang="en-US" altLang="en-US" sz="4000" dirty="0" err="1"/>
-              <a:t>Etiam</a:t>
-            </a:r>
-            <a:r>
-              <a:rPr lang="en-US" altLang="en-US" sz="4000" dirty="0"/>
-              <a:t> </a:t>
-            </a:r>
-            <a:r>
-              <a:rPr lang="en-US" altLang="en-US" sz="4000" dirty="0" err="1"/>
-              <a:t>tristique</a:t>
-            </a:r>
-            <a:r>
-              <a:rPr lang="en-US" altLang="en-US" sz="4000" dirty="0"/>
-              <a:t> </a:t>
-            </a:r>
-            <a:r>
-              <a:rPr lang="en-US" altLang="en-US" sz="4000" dirty="0" err="1"/>
-              <a:t>consequat</a:t>
-            </a:r>
-            <a:r>
-              <a:rPr lang="en-US" altLang="en-US" sz="4000" dirty="0"/>
-              <a:t> </a:t>
-            </a:r>
-            <a:r>
-              <a:rPr lang="en-US" altLang="en-US" sz="4000" dirty="0" err="1"/>
-              <a:t>laoreet</a:t>
-            </a:r>
-            <a:r>
-              <a:rPr lang="en-US" altLang="en-US" sz="4000" dirty="0"/>
-              <a:t>. </a:t>
-            </a:r>
-            <a:r>
-              <a:rPr lang="en-US" altLang="en-US" sz="4000" dirty="0" err="1"/>
-              <a:t>Nunc</a:t>
-            </a:r>
-            <a:r>
-              <a:rPr lang="en-US" altLang="en-US" sz="4000" dirty="0"/>
-              <a:t> </a:t>
-            </a:r>
-            <a:r>
-              <a:rPr lang="en-US" altLang="en-US" sz="4000" dirty="0" err="1"/>
-              <a:t>fermentum</a:t>
-            </a:r>
-            <a:r>
-              <a:rPr lang="en-US" altLang="en-US" sz="4000" dirty="0"/>
-              <a:t> </a:t>
-            </a:r>
-            <a:r>
-              <a:rPr lang="en-US" altLang="en-US" sz="4000" dirty="0" err="1"/>
-              <a:t>pulvinar</a:t>
-            </a:r>
-            <a:r>
-              <a:rPr lang="en-US" altLang="en-US" sz="4000" dirty="0"/>
-              <a:t> </a:t>
-            </a:r>
-            <a:r>
-              <a:rPr lang="en-US" altLang="en-US" sz="4000" dirty="0" err="1"/>
-              <a:t>ornare</a:t>
-            </a:r>
-            <a:r>
-              <a:rPr lang="en-US" altLang="en-US" sz="4000" dirty="0"/>
-              <a:t>.</a:t>
-            </a:r>
-            <a:r>
-              <a:rPr lang="en-US" sz="4000" dirty="0" smtClean="0"/>
-              <a:t> </a:t>
+              <a:rPr lang="en-US" altLang="en-US" sz="4000" dirty="0" smtClean="0"/>
+              <a:t>Hopefully:</a:t>
+            </a:r>
+          </a:p>
+          <a:p>
+            <a:pPr>
+              <a:spcAft>
+                <a:spcPts val="1800"/>
+              </a:spcAft>
+            </a:pPr>
+            <a:r>
+              <a:rPr lang="en-US" altLang="en-US" sz="4000" dirty="0" smtClean="0"/>
+              <a:t>Scientists were able to use our faces to make distinctions between microbial samples.</a:t>
             </a:r>
           </a:p>
           <a:p>
@@ -5454,129 +5330,21 @@
               <a:buChar char="•"/>
             </a:pPr>
             <a:r>
-              <a:rPr lang="en-US" altLang="en-US" sz="4000" dirty="0" err="1"/>
-              <a:t>usce</a:t>
-            </a:r>
-            <a:r>
-              <a:rPr lang="en-US" altLang="en-US" sz="4000" dirty="0"/>
-              <a:t> ac </a:t>
-            </a:r>
-            <a:r>
-              <a:rPr lang="en-US" altLang="en-US" sz="4000" dirty="0" err="1"/>
-              <a:t>nunc</a:t>
-            </a:r>
-            <a:r>
-              <a:rPr lang="en-US" altLang="en-US" sz="4000" dirty="0"/>
-              <a:t> in </a:t>
-            </a:r>
-            <a:r>
-              <a:rPr lang="en-US" altLang="en-US" sz="4000" dirty="0" err="1"/>
-              <a:t>leo</a:t>
-            </a:r>
-            <a:r>
-              <a:rPr lang="en-US" altLang="en-US" sz="4000" dirty="0"/>
-              <a:t> </a:t>
-            </a:r>
-            <a:r>
-              <a:rPr lang="en-US" altLang="en-US" sz="4000" dirty="0" err="1"/>
-              <a:t>blandit</a:t>
-            </a:r>
-            <a:r>
-              <a:rPr lang="en-US" altLang="en-US" sz="4000" dirty="0"/>
-              <a:t> </a:t>
-            </a:r>
-            <a:r>
-              <a:rPr lang="en-US" altLang="en-US" sz="4000" dirty="0" err="1"/>
-              <a:t>sagittis</a:t>
-            </a:r>
-            <a:r>
-              <a:rPr lang="en-US" altLang="en-US" sz="4000" dirty="0"/>
-              <a:t> </a:t>
-            </a:r>
-            <a:r>
-              <a:rPr lang="en-US" altLang="en-US" sz="4000" dirty="0" err="1"/>
-              <a:t>fermentum</a:t>
-            </a:r>
-            <a:r>
-              <a:rPr lang="en-US" altLang="en-US" sz="4000" dirty="0"/>
-              <a:t> </a:t>
-            </a:r>
-            <a:r>
-              <a:rPr lang="en-US" altLang="en-US" sz="4000" dirty="0" err="1"/>
-              <a:t>eu</a:t>
-            </a:r>
-            <a:r>
-              <a:rPr lang="en-US" altLang="en-US" sz="4000" dirty="0"/>
-              <a:t> sem. </a:t>
-            </a:r>
-            <a:r>
-              <a:rPr lang="en-US" altLang="en-US" sz="4000" dirty="0" err="1"/>
-              <a:t>Curabitur</a:t>
-            </a:r>
-            <a:r>
-              <a:rPr lang="en-US" altLang="en-US" sz="4000" dirty="0"/>
-              <a:t> ligula </a:t>
-            </a:r>
-            <a:r>
-              <a:rPr lang="en-US" altLang="en-US" sz="4000" dirty="0" err="1"/>
-              <a:t>odio</a:t>
-            </a:r>
-            <a:r>
-              <a:rPr lang="en-US" altLang="en-US" sz="4000" dirty="0"/>
-              <a:t>, </a:t>
-            </a:r>
-            <a:r>
-              <a:rPr lang="en-US" altLang="en-US" sz="4000" dirty="0" err="1"/>
-              <a:t>facilisis</a:t>
-            </a:r>
-            <a:r>
-              <a:rPr lang="en-US" altLang="en-US" sz="4000" dirty="0"/>
-              <a:t> in </a:t>
-            </a:r>
-            <a:r>
-              <a:rPr lang="en-US" altLang="en-US" sz="4000" dirty="0" err="1"/>
-              <a:t>tincidunt</a:t>
-            </a:r>
-            <a:r>
-              <a:rPr lang="en-US" altLang="en-US" sz="4000" dirty="0"/>
-              <a:t> </a:t>
-            </a:r>
-            <a:r>
-              <a:rPr lang="en-US" altLang="en-US" sz="4000" dirty="0" err="1"/>
-              <a:t>vel</a:t>
-            </a:r>
-            <a:r>
-              <a:rPr lang="en-US" altLang="en-US" sz="4000" dirty="0"/>
-              <a:t>, </a:t>
-            </a:r>
-            <a:r>
-              <a:rPr lang="en-US" altLang="en-US" sz="4000" dirty="0" err="1"/>
-              <a:t>scelerisque</a:t>
-            </a:r>
-            <a:r>
-              <a:rPr lang="en-US" altLang="en-US" sz="4000" dirty="0"/>
-              <a:t> </a:t>
-            </a:r>
-            <a:r>
-              <a:rPr lang="en-US" altLang="en-US" sz="4000" dirty="0" err="1"/>
-              <a:t>quis</a:t>
-            </a:r>
-            <a:r>
-              <a:rPr lang="en-US" altLang="en-US" sz="4000" dirty="0"/>
-              <a:t> </a:t>
-            </a:r>
-            <a:r>
-              <a:rPr lang="en-US" altLang="en-US" sz="4000" dirty="0" err="1"/>
-              <a:t>nulla</a:t>
-            </a:r>
-            <a:r>
-              <a:rPr lang="en-US" altLang="en-US" sz="4000" dirty="0"/>
-              <a:t>.</a:t>
-            </a:r>
+              <a:rPr lang="en-US" altLang="en-US" sz="4000" dirty="0" smtClean="0"/>
+              <a:t>Hopefully:</a:t>
+            </a:r>
+          </a:p>
+          <a:p>
+            <a:pPr>
+              <a:spcAft>
+                <a:spcPts val="1800"/>
+              </a:spcAft>
+            </a:pPr>
             <a:r>
               <a:rPr lang="en-US" sz="4000" dirty="0" smtClean="0"/>
-              <a:t> </a:t>
-            </a:r>
+              <a:t>Scientists were able to use our software to come to a scientific breakthrough.</a:t>
+            </a:r>
+            <a:endParaRPr lang="en-US" sz="4000" dirty="0" smtClean="0"/>
           </a:p>
           <a:p>
             <a:pPr marL="457200" indent="-457200">
@@ -5587,108 +5355,19 @@
               <a:buChar char="•"/>
             </a:pPr>
             <a:r>
-              <a:rPr lang="en-US" altLang="en-US" sz="4000" dirty="0" err="1"/>
-              <a:t>Vivamus</a:t>
-            </a:r>
-            <a:r>
-              <a:rPr lang="en-US" altLang="en-US" sz="4000" dirty="0"/>
-              <a:t> </a:t>
-            </a:r>
-            <a:r>
-              <a:rPr lang="en-US" altLang="en-US" sz="4000" dirty="0" err="1"/>
-              <a:t>interdum</a:t>
-            </a:r>
-            <a:r>
-              <a:rPr lang="en-US" altLang="en-US" sz="4000" dirty="0"/>
-              <a:t> magna </a:t>
-            </a:r>
-            <a:r>
-              <a:rPr lang="en-US" altLang="en-US" sz="4000" dirty="0" err="1"/>
-              <a:t>quis</a:t>
-            </a:r>
-            <a:r>
-              <a:rPr lang="en-US" altLang="en-US" sz="4000" dirty="0"/>
-              <a:t> </a:t>
-            </a:r>
-            <a:r>
-              <a:rPr lang="en-US" altLang="en-US" sz="4000" dirty="0" err="1"/>
-              <a:t>mauris</a:t>
-            </a:r>
-            <a:r>
-              <a:rPr lang="en-US" altLang="en-US" sz="4000" dirty="0"/>
-              <a:t> </a:t>
-            </a:r>
-            <a:r>
-              <a:rPr lang="en-US" altLang="en-US" sz="4000" dirty="0" err="1"/>
-              <a:t>facilisis</a:t>
-            </a:r>
-            <a:r>
-              <a:rPr lang="en-US" altLang="en-US" sz="4000" dirty="0"/>
-              <a:t> </a:t>
-            </a:r>
-            <a:r>
-              <a:rPr lang="en-US" altLang="en-US" sz="4000" dirty="0" err="1"/>
-              <a:t>ornare</a:t>
-            </a:r>
-            <a:r>
-              <a:rPr lang="en-US" altLang="en-US" sz="4000" dirty="0"/>
-              <a:t>. </a:t>
-            </a:r>
-            <a:r>
-              <a:rPr lang="en-US" altLang="en-US" sz="4000" dirty="0" err="1"/>
-              <a:t>Nunc</a:t>
-            </a:r>
-            <a:r>
-              <a:rPr lang="en-US" altLang="en-US" sz="4000" dirty="0"/>
-              <a:t> </a:t>
-            </a:r>
-            <a:r>
-              <a:rPr lang="en-US" altLang="en-US" sz="4000" dirty="0" err="1"/>
-              <a:t>eget</a:t>
-            </a:r>
-            <a:r>
-              <a:rPr lang="en-US" altLang="en-US" sz="4000" dirty="0"/>
-              <a:t> </a:t>
-            </a:r>
-            <a:r>
-              <a:rPr lang="en-US" altLang="en-US" sz="4000" dirty="0" err="1"/>
-              <a:t>lectus</a:t>
-            </a:r>
-            <a:r>
-              <a:rPr lang="en-US" altLang="en-US" sz="4000" dirty="0"/>
-              <a:t> </a:t>
-            </a:r>
-            <a:r>
-              <a:rPr lang="en-US" altLang="en-US" sz="4000" dirty="0" err="1"/>
-              <a:t>massa</a:t>
-            </a:r>
-            <a:r>
-              <a:rPr lang="en-US" altLang="en-US" sz="4000" dirty="0"/>
-              <a:t>, </a:t>
-            </a:r>
-            <a:r>
-              <a:rPr lang="en-US" altLang="en-US" sz="4000" dirty="0" err="1"/>
-              <a:t>quis</a:t>
-            </a:r>
-            <a:r>
-              <a:rPr lang="en-US" altLang="en-US" sz="4000" dirty="0"/>
-              <a:t> </a:t>
-            </a:r>
-            <a:r>
-              <a:rPr lang="en-US" altLang="en-US" sz="4000" dirty="0" err="1"/>
-              <a:t>ullamcorper</a:t>
-            </a:r>
-            <a:r>
-              <a:rPr lang="en-US" altLang="en-US" sz="4000" dirty="0"/>
-              <a:t> </a:t>
-            </a:r>
-            <a:r>
-              <a:rPr lang="en-US" altLang="en-US" sz="4000" dirty="0" err="1"/>
-              <a:t>libero</a:t>
-            </a:r>
-            <a:r>
-              <a:rPr lang="en-US" altLang="en-US" sz="4000" dirty="0"/>
-              <a:t>.</a:t>
+              <a:rPr lang="en-US" altLang="en-US" sz="4000" dirty="0" smtClean="0"/>
+              <a:t>Hopefully:</a:t>
+            </a:r>
+          </a:p>
+          <a:p>
+            <a:pPr>
+              <a:spcAft>
+                <a:spcPts val="1800"/>
+              </a:spcAft>
+            </a:pPr>
+            <a:r>
+              <a:rPr lang="en-US" sz="4000" dirty="0" smtClean="0"/>
+              <a:t>Our software help normal people better understand concepts of microbial communities</a:t>
             </a:r>
             <a:endParaRPr lang="en-US" sz="4000" dirty="0" smtClean="0"/>
           </a:p>
@@ -5898,7 +5577,6 @@
               <a:rPr lang="en-US" sz="4000" dirty="0" smtClean="0"/>
               <a:t>Additional features have been included to allow for easy use and optimal model generation.</a:t>
             </a:r>
-            <a:endParaRPr lang="en-US" sz="4000" dirty="0" smtClean="0"/>
           </a:p>
           <a:p>
             <a:pPr marL="457200" indent="-457200">

</xml_diff>

<commit_message>
Modified poster. Changed graphics software to model generation software regarding makehuman. Corrected a few grammatical errors.
</commit_message>
<xml_diff>
--- a/documentation/expo_poster.pptx
+++ b/documentation/expo_poster.pptx
@@ -109,7 +109,7 @@
   </p:defaultTextStyle>
   <p:extLst>
     <p:ext uri="{EFAFB233-063F-42B5-8137-9DF3F51BA10A}">
-      <p15:sldGuideLst xmlns:p15="http://schemas.microsoft.com/office/powerpoint/2012/main">
+      <p15:sldGuideLst xmlns:p15="http://schemas.microsoft.com/office/powerpoint/2012/main" xmlns="">
         <p15:guide id="1" orient="horz" pos="10368">
           <p15:clr>
             <a:srgbClr val="A4A3A4"/>
@@ -123,7 +123,7 @@
       </p15:sldGuideLst>
     </p:ext>
     <p:ext uri="{2D200454-40CA-4A62-9FC3-DE9A4176ACB9}">
-      <p15:notesGuideLst xmlns:p15="http://schemas.microsoft.com/office/powerpoint/2012/main">
+      <p15:notesGuideLst xmlns:p15="http://schemas.microsoft.com/office/powerpoint/2012/main" xmlns="">
         <p15:guide id="1" orient="horz" pos="2880">
           <p15:clr>
             <a:srgbClr val="A4A3A4"/>
@@ -4621,7 +4621,19 @@
             </a:r>
             <a:r>
               <a:rPr lang="en-US" sz="4000" dirty="0" smtClean="0"/>
-              <a:t> (open source 3D computer graphics software)</a:t>
+              <a:t> (open source 3D </a:t>
+            </a:r>
+            <a:r>
+              <a:rPr lang="en-US" sz="4000" dirty="0" smtClean="0"/>
+              <a:t>model generation</a:t>
+            </a:r>
+            <a:r>
+              <a:rPr lang="en-US" sz="4000" dirty="0" smtClean="0"/>
+              <a:t> </a:t>
+            </a:r>
+            <a:r>
+              <a:rPr lang="en-US" sz="4000" dirty="0" smtClean="0"/>
+              <a:t>software)</a:t>
             </a:r>
           </a:p>
           <a:p>
@@ -4873,7 +4885,19 @@
             </a:pPr>
             <a:r>
               <a:rPr lang="en-US" sz="4000" dirty="0" smtClean="0"/>
-              <a:t>We can harness this by generating faces the represent sample data</a:t>
+              <a:t>We can harness this by generating </a:t>
+            </a:r>
+            <a:r>
+              <a:rPr lang="en-US" sz="4000" smtClean="0"/>
+              <a:t>faces </a:t>
+            </a:r>
+            <a:r>
+              <a:rPr lang="en-US" sz="4000" smtClean="0"/>
+              <a:t>that </a:t>
+            </a:r>
+            <a:r>
+              <a:rPr lang="en-US" sz="4000" dirty="0" smtClean="0"/>
+              <a:t>represent sample data</a:t>
             </a:r>
           </a:p>
           <a:p>
@@ -5281,15 +5305,7 @@
                   <a:srgbClr val="4A6A7E"/>
                 </a:solidFill>
               </a:rPr>
-              <a:t>Results and </a:t>
-            </a:r>
-            <a:r>
-              <a:rPr lang="en-US" sz="7200" dirty="0" smtClean="0">
-                <a:solidFill>
-                  <a:srgbClr val="4A6A7E"/>
-                </a:solidFill>
-              </a:rPr>
-              <a:t>Recommendations</a:t>
+              <a:t>Results and Recommendations</a:t>
             </a:r>
             <a:endParaRPr lang="en-US" sz="7200" dirty="0">
               <a:solidFill>
@@ -5344,7 +5360,6 @@
               <a:rPr lang="en-US" sz="4000" dirty="0" smtClean="0"/>
               <a:t>Scientists were able to use our software to come to a scientific breakthrough.</a:t>
             </a:r>
-            <a:endParaRPr lang="en-US" sz="4000" dirty="0" smtClean="0"/>
           </a:p>
           <a:p>
             <a:pPr marL="457200" indent="-457200">
@@ -5367,9 +5382,16 @@
             </a:pPr>
             <a:r>
               <a:rPr lang="en-US" sz="4000" dirty="0" smtClean="0"/>
-              <a:t>Our software help normal people better understand concepts of microbial communities</a:t>
-            </a:r>
-            <a:endParaRPr lang="en-US" sz="4000" dirty="0" smtClean="0"/>
+              <a:t>Our software </a:t>
+            </a:r>
+            <a:r>
+              <a:rPr lang="en-US" sz="4000" dirty="0" smtClean="0"/>
+              <a:t>helps </a:t>
+            </a:r>
+            <a:r>
+              <a:rPr lang="en-US" sz="4000" dirty="0" smtClean="0"/>
+              <a:t>normal people better understand concepts of microbial communities</a:t>
+            </a:r>
           </a:p>
         </p:txBody>
       </p:sp>

</xml_diff>

<commit_message>
Modified poster, fixed grey model bug
</commit_message>
<xml_diff>
--- a/documentation/expo_poster.pptx
+++ b/documentation/expo_poster.pptx
@@ -109,7 +109,7 @@
   </p:defaultTextStyle>
   <p:extLst>
     <p:ext uri="{EFAFB233-063F-42B5-8137-9DF3F51BA10A}">
-      <p15:sldGuideLst xmlns="" xmlns:p15="http://schemas.microsoft.com/office/powerpoint/2012/main">
+      <p15:sldGuideLst xmlns:p15="http://schemas.microsoft.com/office/powerpoint/2012/main" xmlns="">
         <p15:guide id="1" orient="horz" pos="10368">
           <p15:clr>
             <a:srgbClr val="A4A3A4"/>
@@ -123,7 +123,7 @@
       </p15:sldGuideLst>
     </p:ext>
     <p:ext uri="{2D200454-40CA-4A62-9FC3-DE9A4176ACB9}">
-      <p15:notesGuideLst xmlns="" xmlns:p15="http://schemas.microsoft.com/office/powerpoint/2012/main">
+      <p15:notesGuideLst xmlns:p15="http://schemas.microsoft.com/office/powerpoint/2012/main" xmlns="">
         <p15:guide id="1" orient="horz" pos="2880">
           <p15:clr>
             <a:srgbClr val="A4A3A4"/>
@@ -4207,15 +4207,7 @@
             </a:pPr>
             <a:r>
               <a:rPr lang="en-US" sz="4000" dirty="0" smtClean="0"/>
-              <a:t>Using the </a:t>
-            </a:r>
-            <a:r>
-              <a:rPr lang="en-US" sz="4000" dirty="0" smtClean="0"/>
-              <a:t>open source </a:t>
-            </a:r>
-            <a:r>
-              <a:rPr lang="en-US" sz="4000" dirty="0" smtClean="0"/>
-              <a:t>software </a:t>
+              <a:t>Using the open source software </a:t>
             </a:r>
             <a:r>
               <a:rPr lang="en-US" sz="4000" dirty="0" err="1" smtClean="0"/>
@@ -4630,15 +4622,7 @@
             </a:pPr>
             <a:r>
               <a:rPr lang="en-US" sz="4000" dirty="0" smtClean="0"/>
-              <a:t>Python </a:t>
-            </a:r>
-            <a:r>
-              <a:rPr lang="en-US" sz="4000" dirty="0" smtClean="0"/>
-              <a:t>2.6 </a:t>
-            </a:r>
-            <a:r>
-              <a:rPr lang="en-US" sz="4000" dirty="0" smtClean="0"/>
-              <a:t>(general purpose programming language)</a:t>
+              <a:t>Python 2.6 (general purpose programming language)</a:t>
             </a:r>
           </a:p>
           <a:p>
@@ -5362,15 +5346,7 @@
             </a:pPr>
             <a:r>
               <a:rPr lang="en-US" sz="4000" dirty="0" smtClean="0"/>
-              <a:t>Our software helps normal people better understand </a:t>
-            </a:r>
-            <a:r>
-              <a:rPr lang="en-US" sz="4000" dirty="0" smtClean="0"/>
-              <a:t>the diversity </a:t>
-            </a:r>
-            <a:r>
-              <a:rPr lang="en-US" sz="4000" dirty="0" smtClean="0"/>
-              <a:t>of microbial communities</a:t>
+              <a:t>Our software helps normal people better understand the diversity of microbial communities</a:t>
             </a:r>
           </a:p>
         </p:txBody>
@@ -5841,6 +5817,66 @@
           <a:xfrm>
             <a:off x="11876619" y="13390856"/>
             <a:ext cx="9339141" cy="7479355"/>
+          </a:xfrm>
+          <a:prstGeom prst="rect">
+            <a:avLst/>
+          </a:prstGeom>
+        </p:spPr>
+      </p:pic>
+      <p:pic>
+        <p:nvPicPr>
+          <p:cNvPr id="7" name="Picture 6"/>
+          <p:cNvPicPr>
+            <a:picLocks noChangeAspect="1"/>
+          </p:cNvPicPr>
+          <p:nvPr/>
+        </p:nvPicPr>
+        <p:blipFill>
+          <a:blip r:embed="rId9">
+            <a:extLst>
+              <a:ext uri="{28A0092B-C50C-407E-A947-70E740481C1C}">
+                <a14:useLocalDpi xmlns:a14="http://schemas.microsoft.com/office/drawing/2010/main" val="0"/>
+              </a:ext>
+            </a:extLst>
+          </a:blip>
+          <a:stretch>
+            <a:fillRect/>
+          </a:stretch>
+        </p:blipFill>
+        <p:spPr>
+          <a:xfrm>
+            <a:off x="21739277" y="13390855"/>
+            <a:ext cx="10938215" cy="7130095"/>
+          </a:xfrm>
+          <a:prstGeom prst="rect">
+            <a:avLst/>
+          </a:prstGeom>
+        </p:spPr>
+      </p:pic>
+      <p:pic>
+        <p:nvPicPr>
+          <p:cNvPr id="8" name="Picture 7"/>
+          <p:cNvPicPr>
+            <a:picLocks noChangeAspect="1"/>
+          </p:cNvPicPr>
+          <p:nvPr/>
+        </p:nvPicPr>
+        <p:blipFill>
+          <a:blip r:embed="rId10">
+            <a:extLst>
+              <a:ext uri="{28A0092B-C50C-407E-A947-70E740481C1C}">
+                <a14:useLocalDpi xmlns:a14="http://schemas.microsoft.com/office/drawing/2010/main" val="0"/>
+              </a:ext>
+            </a:extLst>
+          </a:blip>
+          <a:stretch>
+            <a:fillRect/>
+          </a:stretch>
+        </p:blipFill>
+        <p:spPr>
+          <a:xfrm>
+            <a:off x="21244294" y="23287597"/>
+            <a:ext cx="11607932" cy="7130094"/>
           </a:xfrm>
           <a:prstGeom prst="rect">
             <a:avLst/>

</xml_diff>

<commit_message>
Rewrote most of the obj viewer so that it supports multiple parts, which is how I handle multiple materials or groups.
</commit_message>
<xml_diff>
--- a/documentation/expo_poster.pptx
+++ b/documentation/expo_poster.pptx
@@ -109,7 +109,7 @@
   </p:defaultTextStyle>
   <p:extLst>
     <p:ext uri="{EFAFB233-063F-42B5-8137-9DF3F51BA10A}">
-      <p15:sldGuideLst xmlns:p15="http://schemas.microsoft.com/office/powerpoint/2012/main" xmlns="">
+      <p15:sldGuideLst xmlns:p15="http://schemas.microsoft.com/office/powerpoint/2012/main">
         <p15:guide id="1" orient="horz" pos="10368">
           <p15:clr>
             <a:srgbClr val="A4A3A4"/>
@@ -123,7 +123,7 @@
       </p15:sldGuideLst>
     </p:ext>
     <p:ext uri="{2D200454-40CA-4A62-9FC3-DE9A4176ACB9}">
-      <p15:notesGuideLst xmlns:p15="http://schemas.microsoft.com/office/powerpoint/2012/main" xmlns="">
+      <p15:notesGuideLst xmlns:p15="http://schemas.microsoft.com/office/powerpoint/2012/main">
         <p15:guide id="1" orient="horz" pos="2880">
           <p15:clr>
             <a:srgbClr val="A4A3A4"/>
@@ -222,7 +222,7 @@
           <a:p>
             <a:fld id="{0F1A93FA-A810-4E6E-87EB-DCBA577F83C7}" type="datetimeFigureOut">
               <a:rPr lang="en-US" smtClean="0"/>
-              <a:t>3/9/2016</a:t>
+              <a:t>4/24/2016</a:t>
             </a:fld>
             <a:endParaRPr lang="en-US"/>
           </a:p>
@@ -1322,7 +1322,7 @@
           <a:p>
             <a:fld id="{56B6BD69-149A-CD41-9E7C-E241C9398BA0}" type="datetimeFigureOut">
               <a:rPr lang="en-US" smtClean="0"/>
-              <a:t>3/9/2016</a:t>
+              <a:t>4/24/2016</a:t>
             </a:fld>
             <a:endParaRPr lang="en-US"/>
           </a:p>
@@ -1502,7 +1502,7 @@
           <a:p>
             <a:fld id="{56B6BD69-149A-CD41-9E7C-E241C9398BA0}" type="datetimeFigureOut">
               <a:rPr lang="en-US" smtClean="0"/>
-              <a:t>3/9/2016</a:t>
+              <a:t>4/24/2016</a:t>
             </a:fld>
             <a:endParaRPr lang="en-US"/>
           </a:p>
@@ -1672,7 +1672,7 @@
           <a:p>
             <a:fld id="{56B6BD69-149A-CD41-9E7C-E241C9398BA0}" type="datetimeFigureOut">
               <a:rPr lang="en-US" smtClean="0"/>
-              <a:t>3/9/2016</a:t>
+              <a:t>4/24/2016</a:t>
             </a:fld>
             <a:endParaRPr lang="en-US"/>
           </a:p>
@@ -1918,7 +1918,7 @@
           <a:p>
             <a:fld id="{56B6BD69-149A-CD41-9E7C-E241C9398BA0}" type="datetimeFigureOut">
               <a:rPr lang="en-US" smtClean="0"/>
-              <a:t>3/9/2016</a:t>
+              <a:t>4/24/2016</a:t>
             </a:fld>
             <a:endParaRPr lang="en-US"/>
           </a:p>
@@ -2206,7 +2206,7 @@
           <a:p>
             <a:fld id="{56B6BD69-149A-CD41-9E7C-E241C9398BA0}" type="datetimeFigureOut">
               <a:rPr lang="en-US" smtClean="0"/>
-              <a:t>3/9/2016</a:t>
+              <a:t>4/24/2016</a:t>
             </a:fld>
             <a:endParaRPr lang="en-US"/>
           </a:p>
@@ -2633,7 +2633,7 @@
           <a:p>
             <a:fld id="{56B6BD69-149A-CD41-9E7C-E241C9398BA0}" type="datetimeFigureOut">
               <a:rPr lang="en-US" smtClean="0"/>
-              <a:t>3/9/2016</a:t>
+              <a:t>4/24/2016</a:t>
             </a:fld>
             <a:endParaRPr lang="en-US"/>
           </a:p>
@@ -2751,7 +2751,7 @@
           <a:p>
             <a:fld id="{56B6BD69-149A-CD41-9E7C-E241C9398BA0}" type="datetimeFigureOut">
               <a:rPr lang="en-US" smtClean="0"/>
-              <a:t>3/9/2016</a:t>
+              <a:t>4/24/2016</a:t>
             </a:fld>
             <a:endParaRPr lang="en-US"/>
           </a:p>
@@ -2846,7 +2846,7 @@
           <a:p>
             <a:fld id="{56B6BD69-149A-CD41-9E7C-E241C9398BA0}" type="datetimeFigureOut">
               <a:rPr lang="en-US" smtClean="0"/>
-              <a:t>3/9/2016</a:t>
+              <a:t>4/24/2016</a:t>
             </a:fld>
             <a:endParaRPr lang="en-US"/>
           </a:p>
@@ -3123,7 +3123,7 @@
           <a:p>
             <a:fld id="{56B6BD69-149A-CD41-9E7C-E241C9398BA0}" type="datetimeFigureOut">
               <a:rPr lang="en-US" smtClean="0"/>
-              <a:t>3/9/2016</a:t>
+              <a:t>4/24/2016</a:t>
             </a:fld>
             <a:endParaRPr lang="en-US"/>
           </a:p>
@@ -3376,7 +3376,7 @@
           <a:p>
             <a:fld id="{56B6BD69-149A-CD41-9E7C-E241C9398BA0}" type="datetimeFigureOut">
               <a:rPr lang="en-US" smtClean="0"/>
-              <a:t>3/9/2016</a:t>
+              <a:t>4/24/2016</a:t>
             </a:fld>
             <a:endParaRPr lang="en-US"/>
           </a:p>
@@ -3589,7 +3589,7 @@
           <a:p>
             <a:fld id="{56B6BD69-149A-CD41-9E7C-E241C9398BA0}" type="datetimeFigureOut">
               <a:rPr lang="en-US" smtClean="0"/>
-              <a:t>3/9/2016</a:t>
+              <a:t>4/24/2016</a:t>
             </a:fld>
             <a:endParaRPr lang="en-US"/>
           </a:p>
@@ -5269,13 +5269,16 @@
                   <a:srgbClr val="4A6A7E"/>
                 </a:solidFill>
               </a:rPr>
-              <a:t>Results and Recommendations</a:t>
-            </a:r>
-            <a:endParaRPr lang="en-US" sz="7200" dirty="0">
-              <a:solidFill>
-                <a:srgbClr val="4A6A7E"/>
-              </a:solidFill>
-            </a:endParaRPr>
+              <a:t>Results and </a:t>
+            </a:r>
+            <a:r>
+              <a:rPr lang="en-US" sz="7200" dirty="0" smtClean="0">
+                <a:solidFill>
+                  <a:srgbClr val="4A6A7E"/>
+                </a:solidFill>
+              </a:rPr>
+              <a:t>Recommendations</a:t>
+            </a:r>
           </a:p>
           <a:p>
             <a:pPr marL="457200" indent="-457200">
@@ -5287,19 +5290,9 @@
             </a:pPr>
             <a:r>
               <a:rPr lang="en-US" altLang="en-US" sz="4000" dirty="0" smtClean="0"/>
-              <a:t>Hopefully:</a:t>
-            </a:r>
-          </a:p>
-          <a:p>
-            <a:pPr>
-              <a:spcAft>
-                <a:spcPts val="1800"/>
-              </a:spcAft>
-            </a:pPr>
-            <a:r>
-              <a:rPr lang="en-US" altLang="en-US" sz="4000" dirty="0" smtClean="0"/>
-              <a:t>Scientists were able to use our faces to make distinctions between microbial samples.</a:t>
-            </a:r>
+              <a:t>Our tool can read the data file, and create a visualization representative of that data.</a:t>
+            </a:r>
+            <a:endParaRPr lang="en-US" altLang="en-US" sz="4000" dirty="0" smtClean="0"/>
           </a:p>
           <a:p>
             <a:pPr marL="457200" indent="-457200">
@@ -5311,19 +5304,9 @@
             </a:pPr>
             <a:r>
               <a:rPr lang="en-US" altLang="en-US" sz="4000" dirty="0" smtClean="0"/>
-              <a:t>Hopefully:</a:t>
-            </a:r>
-          </a:p>
-          <a:p>
-            <a:pPr>
-              <a:spcAft>
-                <a:spcPts val="1800"/>
-              </a:spcAft>
-            </a:pPr>
-            <a:r>
-              <a:rPr lang="en-US" sz="4000" dirty="0" smtClean="0"/>
-              <a:t>Scientists were able to use our software to come to a scientific breakthrough.</a:t>
-            </a:r>
+              <a:t>That visualization is in the form of a face.</a:t>
+            </a:r>
+            <a:endParaRPr lang="en-US" altLang="en-US" sz="4000" dirty="0" smtClean="0"/>
           </a:p>
           <a:p>
             <a:pPr marL="457200" indent="-457200">
@@ -5335,19 +5318,17 @@
             </a:pPr>
             <a:r>
               <a:rPr lang="en-US" altLang="en-US" sz="4000" dirty="0" smtClean="0"/>
-              <a:t>Hopefully:</a:t>
-            </a:r>
-          </a:p>
-          <a:p>
-            <a:pPr>
-              <a:spcAft>
-                <a:spcPts val="1800"/>
-              </a:spcAft>
-            </a:pPr>
-            <a:r>
-              <a:rPr lang="en-US" sz="4000" dirty="0" smtClean="0"/>
-              <a:t>Our software helps normal people better understand the diversity of microbial communities</a:t>
-            </a:r>
+              <a:t>We recommend research into </a:t>
+            </a:r>
+            <a:r>
+              <a:rPr lang="en-US" altLang="en-US" sz="4000" smtClean="0"/>
+              <a:t>additional ways </a:t>
+            </a:r>
+            <a:r>
+              <a:rPr lang="en-US" altLang="en-US" sz="4000" dirty="0" smtClean="0"/>
+              <a:t>to visualize large, complex data sets like the population data we were provided.</a:t>
+            </a:r>
+            <a:endParaRPr lang="en-US" sz="4000" dirty="0" smtClean="0"/>
           </a:p>
         </p:txBody>
       </p:sp>

</xml_diff>